<commit_message>
add model based reinforcement learning
</commit_message>
<xml_diff>
--- a/pictures/Pictures.pptx
+++ b/pictures/Pictures.pptx
@@ -104,6 +104,11 @@
       </a:defRPr>
     </a:lvl9pPr>
   </p:defaultTextStyle>
+  <p:extLst>
+    <p:ext uri="{EFAFB233-063F-42B5-8137-9DF3F51BA10A}">
+      <p15:sldGuideLst xmlns:p15="http://schemas.microsoft.com/office/powerpoint/2012/main"/>
+    </p:ext>
+  </p:extLst>
 </p:presentation>
 </file>
 
@@ -4711,6 +4716,3084 @@
           </a:p>
         </p:txBody>
       </p:sp>
+      <p:pic>
+        <p:nvPicPr>
+          <p:cNvPr id="3" name="Picture 2">
+            <a:extLst>
+              <a:ext uri="{FF2B5EF4-FFF2-40B4-BE49-F238E27FC236}">
+                <a16:creationId xmlns:a16="http://schemas.microsoft.com/office/drawing/2014/main" id="{06D0CF37-C285-4DC5-A6DE-349C14806E43}"/>
+              </a:ext>
+            </a:extLst>
+          </p:cNvPr>
+          <p:cNvPicPr>
+            <a:picLocks noChangeAspect="1"/>
+          </p:cNvPicPr>
+          <p:nvPr/>
+        </p:nvPicPr>
+        <p:blipFill>
+          <a:blip r:embed="rId2"/>
+          <a:stretch>
+            <a:fillRect/>
+          </a:stretch>
+        </p:blipFill>
+        <p:spPr>
+          <a:xfrm>
+            <a:off x="1470850" y="3114675"/>
+            <a:ext cx="3800475" cy="3743325"/>
+          </a:xfrm>
+          <a:prstGeom prst="rect">
+            <a:avLst/>
+          </a:prstGeom>
+        </p:spPr>
+      </p:pic>
+      <p:sp>
+        <p:nvSpPr>
+          <p:cNvPr id="5" name="Speech Bubble: Oval 4">
+            <a:extLst>
+              <a:ext uri="{FF2B5EF4-FFF2-40B4-BE49-F238E27FC236}">
+                <a16:creationId xmlns:a16="http://schemas.microsoft.com/office/drawing/2014/main" id="{D07FFA84-C981-4427-94EB-68C06ECAC144}"/>
+              </a:ext>
+            </a:extLst>
+          </p:cNvPr>
+          <p:cNvSpPr/>
+          <p:nvPr/>
+        </p:nvSpPr>
+        <p:spPr>
+          <a:xfrm>
+            <a:off x="3748532" y="2864923"/>
+            <a:ext cx="2258568" cy="1738827"/>
+          </a:xfrm>
+          <a:prstGeom prst="wedgeEllipseCallout">
+            <a:avLst>
+              <a:gd name="adj1" fmla="val -53760"/>
+              <a:gd name="adj2" fmla="val 31617"/>
+            </a:avLst>
+          </a:prstGeom>
+          <a:solidFill>
+            <a:schemeClr val="bg1"/>
+          </a:solidFill>
+          <a:ln w="19050">
+            <a:solidFill>
+              <a:schemeClr val="tx1"/>
+            </a:solidFill>
+          </a:ln>
+        </p:spPr>
+        <p:style>
+          <a:lnRef idx="2">
+            <a:schemeClr val="accent1">
+              <a:shade val="50000"/>
+            </a:schemeClr>
+          </a:lnRef>
+          <a:fillRef idx="1">
+            <a:schemeClr val="accent1"/>
+          </a:fillRef>
+          <a:effectRef idx="0">
+            <a:schemeClr val="accent1"/>
+          </a:effectRef>
+          <a:fontRef idx="minor">
+            <a:schemeClr val="lt1"/>
+          </a:fontRef>
+        </p:style>
+        <p:txBody>
+          <a:bodyPr rtlCol="0" anchor="ctr"/>
+          <a:lstStyle/>
+          <a:p>
+            <a:pPr algn="ctr"/>
+            <a:endParaRPr lang="en-US"/>
+          </a:p>
+        </p:txBody>
+      </p:sp>
+      <p:sp>
+        <p:nvSpPr>
+          <p:cNvPr id="7" name="Oval 6">
+            <a:extLst>
+              <a:ext uri="{FF2B5EF4-FFF2-40B4-BE49-F238E27FC236}">
+                <a16:creationId xmlns:a16="http://schemas.microsoft.com/office/drawing/2014/main" id="{442B096B-5675-40D8-A3A1-4DF13F97CB4D}"/>
+              </a:ext>
+            </a:extLst>
+          </p:cNvPr>
+          <p:cNvSpPr/>
+          <p:nvPr/>
+        </p:nvSpPr>
+        <p:spPr>
+          <a:xfrm>
+            <a:off x="4160520" y="3114674"/>
+            <a:ext cx="310896" cy="314325"/>
+          </a:xfrm>
+          <a:prstGeom prst="ellipse">
+            <a:avLst/>
+          </a:prstGeom>
+          <a:solidFill>
+            <a:schemeClr val="accent4">
+              <a:lumMod val="40000"/>
+              <a:lumOff val="60000"/>
+            </a:schemeClr>
+          </a:solidFill>
+          <a:ln>
+            <a:noFill/>
+          </a:ln>
+        </p:spPr>
+        <p:style>
+          <a:lnRef idx="2">
+            <a:schemeClr val="accent4">
+              <a:shade val="50000"/>
+            </a:schemeClr>
+          </a:lnRef>
+          <a:fillRef idx="1">
+            <a:schemeClr val="accent4"/>
+          </a:fillRef>
+          <a:effectRef idx="0">
+            <a:schemeClr val="accent4"/>
+          </a:effectRef>
+          <a:fontRef idx="minor">
+            <a:schemeClr val="lt1"/>
+          </a:fontRef>
+        </p:style>
+        <p:txBody>
+          <a:bodyPr rtlCol="0" anchor="ctr"/>
+          <a:lstStyle/>
+          <a:p>
+            <a:pPr algn="ctr"/>
+            <a:endParaRPr lang="en-US"/>
+          </a:p>
+        </p:txBody>
+      </p:sp>
+      <p:sp>
+        <p:nvSpPr>
+          <p:cNvPr id="8" name="Oval 7">
+            <a:extLst>
+              <a:ext uri="{FF2B5EF4-FFF2-40B4-BE49-F238E27FC236}">
+                <a16:creationId xmlns:a16="http://schemas.microsoft.com/office/drawing/2014/main" id="{264F1798-A80B-4DBA-B66B-E26043DEA954}"/>
+              </a:ext>
+            </a:extLst>
+          </p:cNvPr>
+          <p:cNvSpPr/>
+          <p:nvPr/>
+        </p:nvSpPr>
+        <p:spPr>
+          <a:xfrm>
+            <a:off x="4160520" y="3562730"/>
+            <a:ext cx="310896" cy="314325"/>
+          </a:xfrm>
+          <a:prstGeom prst="ellipse">
+            <a:avLst/>
+          </a:prstGeom>
+          <a:solidFill>
+            <a:schemeClr val="accent4">
+              <a:lumMod val="60000"/>
+              <a:lumOff val="40000"/>
+            </a:schemeClr>
+          </a:solidFill>
+          <a:ln>
+            <a:noFill/>
+          </a:ln>
+        </p:spPr>
+        <p:style>
+          <a:lnRef idx="2">
+            <a:schemeClr val="accent4">
+              <a:shade val="50000"/>
+            </a:schemeClr>
+          </a:lnRef>
+          <a:fillRef idx="1">
+            <a:schemeClr val="accent4"/>
+          </a:fillRef>
+          <a:effectRef idx="0">
+            <a:schemeClr val="accent4"/>
+          </a:effectRef>
+          <a:fontRef idx="minor">
+            <a:schemeClr val="lt1"/>
+          </a:fontRef>
+        </p:style>
+        <p:txBody>
+          <a:bodyPr rtlCol="0" anchor="ctr"/>
+          <a:lstStyle/>
+          <a:p>
+            <a:pPr algn="ctr"/>
+            <a:endParaRPr lang="en-US"/>
+          </a:p>
+        </p:txBody>
+      </p:sp>
+      <p:sp>
+        <p:nvSpPr>
+          <p:cNvPr id="9" name="Oval 8">
+            <a:extLst>
+              <a:ext uri="{FF2B5EF4-FFF2-40B4-BE49-F238E27FC236}">
+                <a16:creationId xmlns:a16="http://schemas.microsoft.com/office/drawing/2014/main" id="{FBEAA1E1-C752-474E-A02C-840307DF3E44}"/>
+              </a:ext>
+            </a:extLst>
+          </p:cNvPr>
+          <p:cNvSpPr/>
+          <p:nvPr/>
+        </p:nvSpPr>
+        <p:spPr>
+          <a:xfrm>
+            <a:off x="4160520" y="4005260"/>
+            <a:ext cx="310896" cy="314325"/>
+          </a:xfrm>
+          <a:prstGeom prst="ellipse">
+            <a:avLst/>
+          </a:prstGeom>
+          <a:solidFill>
+            <a:schemeClr val="accent4">
+              <a:lumMod val="20000"/>
+              <a:lumOff val="80000"/>
+            </a:schemeClr>
+          </a:solidFill>
+          <a:ln>
+            <a:noFill/>
+          </a:ln>
+        </p:spPr>
+        <p:style>
+          <a:lnRef idx="2">
+            <a:schemeClr val="accent4">
+              <a:shade val="50000"/>
+            </a:schemeClr>
+          </a:lnRef>
+          <a:fillRef idx="1">
+            <a:schemeClr val="accent4"/>
+          </a:fillRef>
+          <a:effectRef idx="0">
+            <a:schemeClr val="accent4"/>
+          </a:effectRef>
+          <a:fontRef idx="minor">
+            <a:schemeClr val="lt1"/>
+          </a:fontRef>
+        </p:style>
+        <p:txBody>
+          <a:bodyPr rtlCol="0" anchor="ctr"/>
+          <a:lstStyle/>
+          <a:p>
+            <a:pPr algn="ctr"/>
+            <a:endParaRPr lang="en-US"/>
+          </a:p>
+        </p:txBody>
+      </p:sp>
+      <p:sp>
+        <p:nvSpPr>
+          <p:cNvPr id="10" name="Oval 9">
+            <a:extLst>
+              <a:ext uri="{FF2B5EF4-FFF2-40B4-BE49-F238E27FC236}">
+                <a16:creationId xmlns:a16="http://schemas.microsoft.com/office/drawing/2014/main" id="{EA50854C-1046-4E28-80F3-FAC0E13471BF}"/>
+              </a:ext>
+            </a:extLst>
+          </p:cNvPr>
+          <p:cNvSpPr/>
+          <p:nvPr/>
+        </p:nvSpPr>
+        <p:spPr>
+          <a:xfrm>
+            <a:off x="5271325" y="3114674"/>
+            <a:ext cx="310896" cy="314325"/>
+          </a:xfrm>
+          <a:prstGeom prst="ellipse">
+            <a:avLst/>
+          </a:prstGeom>
+          <a:solidFill>
+            <a:schemeClr val="accent4">
+              <a:lumMod val="60000"/>
+              <a:lumOff val="40000"/>
+            </a:schemeClr>
+          </a:solidFill>
+          <a:ln>
+            <a:noFill/>
+          </a:ln>
+        </p:spPr>
+        <p:style>
+          <a:lnRef idx="2">
+            <a:schemeClr val="accent4">
+              <a:shade val="50000"/>
+            </a:schemeClr>
+          </a:lnRef>
+          <a:fillRef idx="1">
+            <a:schemeClr val="accent4"/>
+          </a:fillRef>
+          <a:effectRef idx="0">
+            <a:schemeClr val="accent4"/>
+          </a:effectRef>
+          <a:fontRef idx="minor">
+            <a:schemeClr val="lt1"/>
+          </a:fontRef>
+        </p:style>
+        <p:txBody>
+          <a:bodyPr rtlCol="0" anchor="ctr"/>
+          <a:lstStyle/>
+          <a:p>
+            <a:pPr algn="ctr"/>
+            <a:endParaRPr lang="en-US"/>
+          </a:p>
+        </p:txBody>
+      </p:sp>
+      <p:sp>
+        <p:nvSpPr>
+          <p:cNvPr id="11" name="Oval 10">
+            <a:extLst>
+              <a:ext uri="{FF2B5EF4-FFF2-40B4-BE49-F238E27FC236}">
+                <a16:creationId xmlns:a16="http://schemas.microsoft.com/office/drawing/2014/main" id="{7674CF52-2388-452B-8879-1AFD00B8FEBE}"/>
+              </a:ext>
+            </a:extLst>
+          </p:cNvPr>
+          <p:cNvSpPr/>
+          <p:nvPr/>
+        </p:nvSpPr>
+        <p:spPr>
+          <a:xfrm>
+            <a:off x="5271325" y="3562730"/>
+            <a:ext cx="310896" cy="314325"/>
+          </a:xfrm>
+          <a:prstGeom prst="ellipse">
+            <a:avLst/>
+          </a:prstGeom>
+          <a:solidFill>
+            <a:schemeClr val="accent4">
+              <a:lumMod val="20000"/>
+              <a:lumOff val="80000"/>
+            </a:schemeClr>
+          </a:solidFill>
+          <a:ln>
+            <a:noFill/>
+          </a:ln>
+        </p:spPr>
+        <p:style>
+          <a:lnRef idx="2">
+            <a:schemeClr val="accent4">
+              <a:shade val="50000"/>
+            </a:schemeClr>
+          </a:lnRef>
+          <a:fillRef idx="1">
+            <a:schemeClr val="accent4"/>
+          </a:fillRef>
+          <a:effectRef idx="0">
+            <a:schemeClr val="accent4"/>
+          </a:effectRef>
+          <a:fontRef idx="minor">
+            <a:schemeClr val="lt1"/>
+          </a:fontRef>
+        </p:style>
+        <p:txBody>
+          <a:bodyPr rtlCol="0" anchor="ctr"/>
+          <a:lstStyle/>
+          <a:p>
+            <a:pPr algn="ctr"/>
+            <a:endParaRPr lang="en-US"/>
+          </a:p>
+        </p:txBody>
+      </p:sp>
+      <p:sp>
+        <p:nvSpPr>
+          <p:cNvPr id="12" name="Oval 11">
+            <a:extLst>
+              <a:ext uri="{FF2B5EF4-FFF2-40B4-BE49-F238E27FC236}">
+                <a16:creationId xmlns:a16="http://schemas.microsoft.com/office/drawing/2014/main" id="{B304DD40-EE0A-4B11-ADF3-69D5CCA55FF8}"/>
+              </a:ext>
+            </a:extLst>
+          </p:cNvPr>
+          <p:cNvSpPr/>
+          <p:nvPr/>
+        </p:nvSpPr>
+        <p:spPr>
+          <a:xfrm>
+            <a:off x="5271325" y="4005260"/>
+            <a:ext cx="310896" cy="314325"/>
+          </a:xfrm>
+          <a:prstGeom prst="ellipse">
+            <a:avLst/>
+          </a:prstGeom>
+          <a:solidFill>
+            <a:schemeClr val="accent4">
+              <a:lumMod val="40000"/>
+              <a:lumOff val="60000"/>
+            </a:schemeClr>
+          </a:solidFill>
+          <a:ln>
+            <a:noFill/>
+          </a:ln>
+        </p:spPr>
+        <p:style>
+          <a:lnRef idx="2">
+            <a:schemeClr val="accent4">
+              <a:shade val="50000"/>
+            </a:schemeClr>
+          </a:lnRef>
+          <a:fillRef idx="1">
+            <a:schemeClr val="accent4"/>
+          </a:fillRef>
+          <a:effectRef idx="0">
+            <a:schemeClr val="accent4"/>
+          </a:effectRef>
+          <a:fontRef idx="minor">
+            <a:schemeClr val="lt1"/>
+          </a:fontRef>
+        </p:style>
+        <p:txBody>
+          <a:bodyPr rtlCol="0" anchor="ctr"/>
+          <a:lstStyle/>
+          <a:p>
+            <a:pPr algn="ctr"/>
+            <a:endParaRPr lang="en-US"/>
+          </a:p>
+        </p:txBody>
+      </p:sp>
+      <p:sp>
+        <p:nvSpPr>
+          <p:cNvPr id="13" name="Oval 12">
+            <a:extLst>
+              <a:ext uri="{FF2B5EF4-FFF2-40B4-BE49-F238E27FC236}">
+                <a16:creationId xmlns:a16="http://schemas.microsoft.com/office/drawing/2014/main" id="{69036BEE-5FA8-4767-8544-22CD58C776C3}"/>
+              </a:ext>
+            </a:extLst>
+          </p:cNvPr>
+          <p:cNvSpPr/>
+          <p:nvPr/>
+        </p:nvSpPr>
+        <p:spPr>
+          <a:xfrm>
+            <a:off x="4715922" y="3349624"/>
+            <a:ext cx="310896" cy="314325"/>
+          </a:xfrm>
+          <a:prstGeom prst="ellipse">
+            <a:avLst/>
+          </a:prstGeom>
+          <a:solidFill>
+            <a:schemeClr val="accent4">
+              <a:lumMod val="60000"/>
+              <a:lumOff val="40000"/>
+            </a:schemeClr>
+          </a:solidFill>
+          <a:ln>
+            <a:noFill/>
+          </a:ln>
+        </p:spPr>
+        <p:style>
+          <a:lnRef idx="2">
+            <a:schemeClr val="accent4">
+              <a:shade val="50000"/>
+            </a:schemeClr>
+          </a:lnRef>
+          <a:fillRef idx="1">
+            <a:schemeClr val="accent4"/>
+          </a:fillRef>
+          <a:effectRef idx="0">
+            <a:schemeClr val="accent4"/>
+          </a:effectRef>
+          <a:fontRef idx="minor">
+            <a:schemeClr val="lt1"/>
+          </a:fontRef>
+        </p:style>
+        <p:txBody>
+          <a:bodyPr rtlCol="0" anchor="ctr"/>
+          <a:lstStyle/>
+          <a:p>
+            <a:pPr algn="ctr"/>
+            <a:endParaRPr lang="en-US"/>
+          </a:p>
+        </p:txBody>
+      </p:sp>
+      <p:sp>
+        <p:nvSpPr>
+          <p:cNvPr id="14" name="Oval 13">
+            <a:extLst>
+              <a:ext uri="{FF2B5EF4-FFF2-40B4-BE49-F238E27FC236}">
+                <a16:creationId xmlns:a16="http://schemas.microsoft.com/office/drawing/2014/main" id="{FBB05AE6-B102-4A2D-825A-B709AB566A91}"/>
+              </a:ext>
+            </a:extLst>
+          </p:cNvPr>
+          <p:cNvSpPr/>
+          <p:nvPr/>
+        </p:nvSpPr>
+        <p:spPr>
+          <a:xfrm>
+            <a:off x="4715922" y="3797680"/>
+            <a:ext cx="310896" cy="314325"/>
+          </a:xfrm>
+          <a:prstGeom prst="ellipse">
+            <a:avLst/>
+          </a:prstGeom>
+          <a:solidFill>
+            <a:schemeClr val="accent4">
+              <a:lumMod val="40000"/>
+              <a:lumOff val="60000"/>
+            </a:schemeClr>
+          </a:solidFill>
+          <a:ln>
+            <a:noFill/>
+          </a:ln>
+        </p:spPr>
+        <p:style>
+          <a:lnRef idx="2">
+            <a:schemeClr val="accent4">
+              <a:shade val="50000"/>
+            </a:schemeClr>
+          </a:lnRef>
+          <a:fillRef idx="1">
+            <a:schemeClr val="accent4"/>
+          </a:fillRef>
+          <a:effectRef idx="0">
+            <a:schemeClr val="accent4"/>
+          </a:effectRef>
+          <a:fontRef idx="minor">
+            <a:schemeClr val="lt1"/>
+          </a:fontRef>
+        </p:style>
+        <p:txBody>
+          <a:bodyPr rtlCol="0" anchor="ctr"/>
+          <a:lstStyle/>
+          <a:p>
+            <a:pPr algn="ctr"/>
+            <a:endParaRPr lang="en-US"/>
+          </a:p>
+        </p:txBody>
+      </p:sp>
+      <p:cxnSp>
+        <p:nvCxnSpPr>
+          <p:cNvPr id="16" name="Straight Connector 15">
+            <a:extLst>
+              <a:ext uri="{FF2B5EF4-FFF2-40B4-BE49-F238E27FC236}">
+                <a16:creationId xmlns:a16="http://schemas.microsoft.com/office/drawing/2014/main" id="{42B3D101-7058-440A-8460-07045863F781}"/>
+              </a:ext>
+            </a:extLst>
+          </p:cNvPr>
+          <p:cNvCxnSpPr>
+            <a:stCxn id="7" idx="6"/>
+            <a:endCxn id="14" idx="2"/>
+          </p:cNvCxnSpPr>
+          <p:nvPr/>
+        </p:nvCxnSpPr>
+        <p:spPr>
+          <a:xfrm>
+            <a:off x="4471416" y="3271837"/>
+            <a:ext cx="244506" cy="683006"/>
+          </a:xfrm>
+          <a:prstGeom prst="line">
+            <a:avLst/>
+          </a:prstGeom>
+          <a:ln w="12700">
+            <a:solidFill>
+              <a:schemeClr val="accent4">
+                <a:lumMod val="60000"/>
+                <a:lumOff val="40000"/>
+              </a:schemeClr>
+            </a:solidFill>
+          </a:ln>
+        </p:spPr>
+        <p:style>
+          <a:lnRef idx="1">
+            <a:schemeClr val="accent1"/>
+          </a:lnRef>
+          <a:fillRef idx="0">
+            <a:schemeClr val="accent1"/>
+          </a:fillRef>
+          <a:effectRef idx="0">
+            <a:schemeClr val="accent1"/>
+          </a:effectRef>
+          <a:fontRef idx="minor">
+            <a:schemeClr val="tx1"/>
+          </a:fontRef>
+        </p:style>
+      </p:cxnSp>
+      <p:cxnSp>
+        <p:nvCxnSpPr>
+          <p:cNvPr id="17" name="Straight Connector 16">
+            <a:extLst>
+              <a:ext uri="{FF2B5EF4-FFF2-40B4-BE49-F238E27FC236}">
+                <a16:creationId xmlns:a16="http://schemas.microsoft.com/office/drawing/2014/main" id="{D5071443-37B2-4F91-8699-F9F3BAAAC953}"/>
+              </a:ext>
+            </a:extLst>
+          </p:cNvPr>
+          <p:cNvCxnSpPr>
+            <a:cxnSpLocks/>
+            <a:stCxn id="8" idx="6"/>
+            <a:endCxn id="14" idx="2"/>
+          </p:cNvCxnSpPr>
+          <p:nvPr/>
+        </p:nvCxnSpPr>
+        <p:spPr>
+          <a:xfrm>
+            <a:off x="4471416" y="3719893"/>
+            <a:ext cx="244506" cy="234950"/>
+          </a:xfrm>
+          <a:prstGeom prst="line">
+            <a:avLst/>
+          </a:prstGeom>
+          <a:ln w="19050">
+            <a:solidFill>
+              <a:schemeClr val="accent4">
+                <a:lumMod val="60000"/>
+                <a:lumOff val="40000"/>
+              </a:schemeClr>
+            </a:solidFill>
+          </a:ln>
+        </p:spPr>
+        <p:style>
+          <a:lnRef idx="1">
+            <a:schemeClr val="accent1"/>
+          </a:lnRef>
+          <a:fillRef idx="0">
+            <a:schemeClr val="accent1"/>
+          </a:fillRef>
+          <a:effectRef idx="0">
+            <a:schemeClr val="accent1"/>
+          </a:effectRef>
+          <a:fontRef idx="minor">
+            <a:schemeClr val="tx1"/>
+          </a:fontRef>
+        </p:style>
+      </p:cxnSp>
+      <p:cxnSp>
+        <p:nvCxnSpPr>
+          <p:cNvPr id="20" name="Straight Connector 19">
+            <a:extLst>
+              <a:ext uri="{FF2B5EF4-FFF2-40B4-BE49-F238E27FC236}">
+                <a16:creationId xmlns:a16="http://schemas.microsoft.com/office/drawing/2014/main" id="{901A7DA3-3632-4426-B0AE-B87825E3DEB8}"/>
+              </a:ext>
+            </a:extLst>
+          </p:cNvPr>
+          <p:cNvCxnSpPr>
+            <a:cxnSpLocks/>
+            <a:stCxn id="9" idx="6"/>
+            <a:endCxn id="14" idx="2"/>
+          </p:cNvCxnSpPr>
+          <p:nvPr/>
+        </p:nvCxnSpPr>
+        <p:spPr>
+          <a:xfrm flipV="1">
+            <a:off x="4471416" y="3954843"/>
+            <a:ext cx="244506" cy="207580"/>
+          </a:xfrm>
+          <a:prstGeom prst="line">
+            <a:avLst/>
+          </a:prstGeom>
+          <a:ln w="19050">
+            <a:solidFill>
+              <a:schemeClr val="accent4">
+                <a:lumMod val="60000"/>
+                <a:lumOff val="40000"/>
+              </a:schemeClr>
+            </a:solidFill>
+          </a:ln>
+        </p:spPr>
+        <p:style>
+          <a:lnRef idx="1">
+            <a:schemeClr val="accent1"/>
+          </a:lnRef>
+          <a:fillRef idx="0">
+            <a:schemeClr val="accent1"/>
+          </a:fillRef>
+          <a:effectRef idx="0">
+            <a:schemeClr val="accent1"/>
+          </a:effectRef>
+          <a:fontRef idx="minor">
+            <a:schemeClr val="tx1"/>
+          </a:fontRef>
+        </p:style>
+      </p:cxnSp>
+      <p:cxnSp>
+        <p:nvCxnSpPr>
+          <p:cNvPr id="23" name="Straight Connector 22">
+            <a:extLst>
+              <a:ext uri="{FF2B5EF4-FFF2-40B4-BE49-F238E27FC236}">
+                <a16:creationId xmlns:a16="http://schemas.microsoft.com/office/drawing/2014/main" id="{F06F739C-F06C-493C-A7C5-EF3AF3958AD2}"/>
+              </a:ext>
+            </a:extLst>
+          </p:cNvPr>
+          <p:cNvCxnSpPr>
+            <a:cxnSpLocks/>
+            <a:stCxn id="7" idx="6"/>
+            <a:endCxn id="13" idx="2"/>
+          </p:cNvCxnSpPr>
+          <p:nvPr/>
+        </p:nvCxnSpPr>
+        <p:spPr>
+          <a:xfrm>
+            <a:off x="4471416" y="3271837"/>
+            <a:ext cx="244506" cy="234950"/>
+          </a:xfrm>
+          <a:prstGeom prst="line">
+            <a:avLst/>
+          </a:prstGeom>
+          <a:ln w="6350">
+            <a:solidFill>
+              <a:schemeClr val="accent4">
+                <a:lumMod val="60000"/>
+                <a:lumOff val="40000"/>
+              </a:schemeClr>
+            </a:solidFill>
+          </a:ln>
+        </p:spPr>
+        <p:style>
+          <a:lnRef idx="1">
+            <a:schemeClr val="accent1"/>
+          </a:lnRef>
+          <a:fillRef idx="0">
+            <a:schemeClr val="accent1"/>
+          </a:fillRef>
+          <a:effectRef idx="0">
+            <a:schemeClr val="accent1"/>
+          </a:effectRef>
+          <a:fontRef idx="minor">
+            <a:schemeClr val="tx1"/>
+          </a:fontRef>
+        </p:style>
+      </p:cxnSp>
+      <p:cxnSp>
+        <p:nvCxnSpPr>
+          <p:cNvPr id="26" name="Straight Connector 25">
+            <a:extLst>
+              <a:ext uri="{FF2B5EF4-FFF2-40B4-BE49-F238E27FC236}">
+                <a16:creationId xmlns:a16="http://schemas.microsoft.com/office/drawing/2014/main" id="{A7EB0CC9-BBD4-4BFD-B15F-2BBA8C7D3766}"/>
+              </a:ext>
+            </a:extLst>
+          </p:cNvPr>
+          <p:cNvCxnSpPr>
+            <a:cxnSpLocks/>
+            <a:stCxn id="8" idx="6"/>
+            <a:endCxn id="13" idx="2"/>
+          </p:cNvCxnSpPr>
+          <p:nvPr/>
+        </p:nvCxnSpPr>
+        <p:spPr>
+          <a:xfrm flipV="1">
+            <a:off x="4471416" y="3506787"/>
+            <a:ext cx="244506" cy="213106"/>
+          </a:xfrm>
+          <a:prstGeom prst="line">
+            <a:avLst/>
+          </a:prstGeom>
+          <a:ln w="28575">
+            <a:solidFill>
+              <a:schemeClr val="accent4">
+                <a:lumMod val="60000"/>
+                <a:lumOff val="40000"/>
+              </a:schemeClr>
+            </a:solidFill>
+          </a:ln>
+        </p:spPr>
+        <p:style>
+          <a:lnRef idx="1">
+            <a:schemeClr val="accent1"/>
+          </a:lnRef>
+          <a:fillRef idx="0">
+            <a:schemeClr val="accent1"/>
+          </a:fillRef>
+          <a:effectRef idx="0">
+            <a:schemeClr val="accent1"/>
+          </a:effectRef>
+          <a:fontRef idx="minor">
+            <a:schemeClr val="tx1"/>
+          </a:fontRef>
+        </p:style>
+      </p:cxnSp>
+      <p:cxnSp>
+        <p:nvCxnSpPr>
+          <p:cNvPr id="29" name="Straight Connector 28">
+            <a:extLst>
+              <a:ext uri="{FF2B5EF4-FFF2-40B4-BE49-F238E27FC236}">
+                <a16:creationId xmlns:a16="http://schemas.microsoft.com/office/drawing/2014/main" id="{7F16C73F-953F-4484-A933-CD440C9B63D7}"/>
+              </a:ext>
+            </a:extLst>
+          </p:cNvPr>
+          <p:cNvCxnSpPr>
+            <a:cxnSpLocks/>
+            <a:stCxn id="9" idx="6"/>
+            <a:endCxn id="13" idx="2"/>
+          </p:cNvCxnSpPr>
+          <p:nvPr/>
+        </p:nvCxnSpPr>
+        <p:spPr>
+          <a:xfrm flipV="1">
+            <a:off x="4471416" y="3506787"/>
+            <a:ext cx="244506" cy="655636"/>
+          </a:xfrm>
+          <a:prstGeom prst="line">
+            <a:avLst/>
+          </a:prstGeom>
+          <a:ln w="19050">
+            <a:solidFill>
+              <a:schemeClr val="accent4">
+                <a:lumMod val="40000"/>
+                <a:lumOff val="60000"/>
+              </a:schemeClr>
+            </a:solidFill>
+          </a:ln>
+        </p:spPr>
+        <p:style>
+          <a:lnRef idx="1">
+            <a:schemeClr val="accent1"/>
+          </a:lnRef>
+          <a:fillRef idx="0">
+            <a:schemeClr val="accent1"/>
+          </a:fillRef>
+          <a:effectRef idx="0">
+            <a:schemeClr val="accent1"/>
+          </a:effectRef>
+          <a:fontRef idx="minor">
+            <a:schemeClr val="tx1"/>
+          </a:fontRef>
+        </p:style>
+      </p:cxnSp>
+      <p:cxnSp>
+        <p:nvCxnSpPr>
+          <p:cNvPr id="32" name="Straight Connector 31">
+            <a:extLst>
+              <a:ext uri="{FF2B5EF4-FFF2-40B4-BE49-F238E27FC236}">
+                <a16:creationId xmlns:a16="http://schemas.microsoft.com/office/drawing/2014/main" id="{B9BAFE18-8D71-46BB-8E1C-78576F688263}"/>
+              </a:ext>
+            </a:extLst>
+          </p:cNvPr>
+          <p:cNvCxnSpPr>
+            <a:cxnSpLocks/>
+            <a:stCxn id="14" idx="6"/>
+            <a:endCxn id="10" idx="2"/>
+          </p:cNvCxnSpPr>
+          <p:nvPr/>
+        </p:nvCxnSpPr>
+        <p:spPr>
+          <a:xfrm flipV="1">
+            <a:off x="5026818" y="3271837"/>
+            <a:ext cx="244507" cy="683006"/>
+          </a:xfrm>
+          <a:prstGeom prst="line">
+            <a:avLst/>
+          </a:prstGeom>
+          <a:ln w="9525">
+            <a:solidFill>
+              <a:schemeClr val="accent4">
+                <a:lumMod val="60000"/>
+                <a:lumOff val="40000"/>
+              </a:schemeClr>
+            </a:solidFill>
+          </a:ln>
+        </p:spPr>
+        <p:style>
+          <a:lnRef idx="1">
+            <a:schemeClr val="accent1"/>
+          </a:lnRef>
+          <a:fillRef idx="0">
+            <a:schemeClr val="accent1"/>
+          </a:fillRef>
+          <a:effectRef idx="0">
+            <a:schemeClr val="accent1"/>
+          </a:effectRef>
+          <a:fontRef idx="minor">
+            <a:schemeClr val="tx1"/>
+          </a:fontRef>
+        </p:style>
+      </p:cxnSp>
+      <p:cxnSp>
+        <p:nvCxnSpPr>
+          <p:cNvPr id="35" name="Straight Connector 34">
+            <a:extLst>
+              <a:ext uri="{FF2B5EF4-FFF2-40B4-BE49-F238E27FC236}">
+                <a16:creationId xmlns:a16="http://schemas.microsoft.com/office/drawing/2014/main" id="{2C2AA505-77E2-4D8E-9BB7-44280AC9C711}"/>
+              </a:ext>
+            </a:extLst>
+          </p:cNvPr>
+          <p:cNvCxnSpPr>
+            <a:cxnSpLocks/>
+            <a:stCxn id="13" idx="6"/>
+            <a:endCxn id="10" idx="2"/>
+          </p:cNvCxnSpPr>
+          <p:nvPr/>
+        </p:nvCxnSpPr>
+        <p:spPr>
+          <a:xfrm flipV="1">
+            <a:off x="5026818" y="3271837"/>
+            <a:ext cx="244507" cy="234950"/>
+          </a:xfrm>
+          <a:prstGeom prst="line">
+            <a:avLst/>
+          </a:prstGeom>
+          <a:ln w="9525">
+            <a:solidFill>
+              <a:schemeClr val="accent4">
+                <a:lumMod val="60000"/>
+                <a:lumOff val="40000"/>
+              </a:schemeClr>
+            </a:solidFill>
+          </a:ln>
+        </p:spPr>
+        <p:style>
+          <a:lnRef idx="1">
+            <a:schemeClr val="accent1"/>
+          </a:lnRef>
+          <a:fillRef idx="0">
+            <a:schemeClr val="accent1"/>
+          </a:fillRef>
+          <a:effectRef idx="0">
+            <a:schemeClr val="accent1"/>
+          </a:effectRef>
+          <a:fontRef idx="minor">
+            <a:schemeClr val="tx1"/>
+          </a:fontRef>
+        </p:style>
+      </p:cxnSp>
+      <p:cxnSp>
+        <p:nvCxnSpPr>
+          <p:cNvPr id="38" name="Straight Connector 37">
+            <a:extLst>
+              <a:ext uri="{FF2B5EF4-FFF2-40B4-BE49-F238E27FC236}">
+                <a16:creationId xmlns:a16="http://schemas.microsoft.com/office/drawing/2014/main" id="{DC52F03F-8B38-4D05-AA4D-8444D2803C11}"/>
+              </a:ext>
+            </a:extLst>
+          </p:cNvPr>
+          <p:cNvCxnSpPr>
+            <a:cxnSpLocks/>
+            <a:stCxn id="13" idx="6"/>
+            <a:endCxn id="11" idx="2"/>
+          </p:cNvCxnSpPr>
+          <p:nvPr/>
+        </p:nvCxnSpPr>
+        <p:spPr>
+          <a:xfrm>
+            <a:off x="5026818" y="3506787"/>
+            <a:ext cx="244507" cy="213106"/>
+          </a:xfrm>
+          <a:prstGeom prst="line">
+            <a:avLst/>
+          </a:prstGeom>
+          <a:ln w="19050">
+            <a:solidFill>
+              <a:schemeClr val="accent4">
+                <a:lumMod val="60000"/>
+                <a:lumOff val="40000"/>
+              </a:schemeClr>
+            </a:solidFill>
+          </a:ln>
+        </p:spPr>
+        <p:style>
+          <a:lnRef idx="1">
+            <a:schemeClr val="accent1"/>
+          </a:lnRef>
+          <a:fillRef idx="0">
+            <a:schemeClr val="accent1"/>
+          </a:fillRef>
+          <a:effectRef idx="0">
+            <a:schemeClr val="accent1"/>
+          </a:effectRef>
+          <a:fontRef idx="minor">
+            <a:schemeClr val="tx1"/>
+          </a:fontRef>
+        </p:style>
+      </p:cxnSp>
+      <p:cxnSp>
+        <p:nvCxnSpPr>
+          <p:cNvPr id="41" name="Straight Connector 40">
+            <a:extLst>
+              <a:ext uri="{FF2B5EF4-FFF2-40B4-BE49-F238E27FC236}">
+                <a16:creationId xmlns:a16="http://schemas.microsoft.com/office/drawing/2014/main" id="{74C5835A-434A-4DF2-AE1B-CC8AFF645AB5}"/>
+              </a:ext>
+            </a:extLst>
+          </p:cNvPr>
+          <p:cNvCxnSpPr>
+            <a:cxnSpLocks/>
+            <a:stCxn id="14" idx="6"/>
+            <a:endCxn id="11" idx="2"/>
+          </p:cNvCxnSpPr>
+          <p:nvPr/>
+        </p:nvCxnSpPr>
+        <p:spPr>
+          <a:xfrm flipV="1">
+            <a:off x="5026818" y="3719893"/>
+            <a:ext cx="244507" cy="234950"/>
+          </a:xfrm>
+          <a:prstGeom prst="line">
+            <a:avLst/>
+          </a:prstGeom>
+          <a:ln w="19050">
+            <a:solidFill>
+              <a:schemeClr val="accent4">
+                <a:lumMod val="60000"/>
+                <a:lumOff val="40000"/>
+              </a:schemeClr>
+            </a:solidFill>
+          </a:ln>
+        </p:spPr>
+        <p:style>
+          <a:lnRef idx="1">
+            <a:schemeClr val="accent1"/>
+          </a:lnRef>
+          <a:fillRef idx="0">
+            <a:schemeClr val="accent1"/>
+          </a:fillRef>
+          <a:effectRef idx="0">
+            <a:schemeClr val="accent1"/>
+          </a:effectRef>
+          <a:fontRef idx="minor">
+            <a:schemeClr val="tx1"/>
+          </a:fontRef>
+        </p:style>
+      </p:cxnSp>
+      <p:cxnSp>
+        <p:nvCxnSpPr>
+          <p:cNvPr id="44" name="Straight Connector 43">
+            <a:extLst>
+              <a:ext uri="{FF2B5EF4-FFF2-40B4-BE49-F238E27FC236}">
+                <a16:creationId xmlns:a16="http://schemas.microsoft.com/office/drawing/2014/main" id="{08566D8D-9D56-4C68-A0B8-40E38908BE0C}"/>
+              </a:ext>
+            </a:extLst>
+          </p:cNvPr>
+          <p:cNvCxnSpPr>
+            <a:cxnSpLocks/>
+            <a:stCxn id="14" idx="6"/>
+            <a:endCxn id="12" idx="2"/>
+          </p:cNvCxnSpPr>
+          <p:nvPr/>
+        </p:nvCxnSpPr>
+        <p:spPr>
+          <a:xfrm>
+            <a:off x="5026818" y="3954843"/>
+            <a:ext cx="244507" cy="207580"/>
+          </a:xfrm>
+          <a:prstGeom prst="line">
+            <a:avLst/>
+          </a:prstGeom>
+          <a:ln w="19050">
+            <a:solidFill>
+              <a:schemeClr val="accent4">
+                <a:lumMod val="60000"/>
+                <a:lumOff val="40000"/>
+              </a:schemeClr>
+            </a:solidFill>
+          </a:ln>
+        </p:spPr>
+        <p:style>
+          <a:lnRef idx="1">
+            <a:schemeClr val="accent1"/>
+          </a:lnRef>
+          <a:fillRef idx="0">
+            <a:schemeClr val="accent1"/>
+          </a:fillRef>
+          <a:effectRef idx="0">
+            <a:schemeClr val="accent1"/>
+          </a:effectRef>
+          <a:fontRef idx="minor">
+            <a:schemeClr val="tx1"/>
+          </a:fontRef>
+        </p:style>
+      </p:cxnSp>
+      <p:cxnSp>
+        <p:nvCxnSpPr>
+          <p:cNvPr id="47" name="Straight Connector 46">
+            <a:extLst>
+              <a:ext uri="{FF2B5EF4-FFF2-40B4-BE49-F238E27FC236}">
+                <a16:creationId xmlns:a16="http://schemas.microsoft.com/office/drawing/2014/main" id="{C0A4F5CD-4510-45E9-8F38-31D09453AC2D}"/>
+              </a:ext>
+            </a:extLst>
+          </p:cNvPr>
+          <p:cNvCxnSpPr>
+            <a:cxnSpLocks/>
+            <a:stCxn id="13" idx="6"/>
+            <a:endCxn id="12" idx="2"/>
+          </p:cNvCxnSpPr>
+          <p:nvPr/>
+        </p:nvCxnSpPr>
+        <p:spPr>
+          <a:xfrm>
+            <a:off x="5026818" y="3506787"/>
+            <a:ext cx="244507" cy="655636"/>
+          </a:xfrm>
+          <a:prstGeom prst="line">
+            <a:avLst/>
+          </a:prstGeom>
+          <a:ln w="28575">
+            <a:solidFill>
+              <a:schemeClr val="accent4">
+                <a:lumMod val="60000"/>
+                <a:lumOff val="40000"/>
+              </a:schemeClr>
+            </a:solidFill>
+          </a:ln>
+        </p:spPr>
+        <p:style>
+          <a:lnRef idx="1">
+            <a:schemeClr val="accent1"/>
+          </a:lnRef>
+          <a:fillRef idx="0">
+            <a:schemeClr val="accent1"/>
+          </a:fillRef>
+          <a:effectRef idx="0">
+            <a:schemeClr val="accent1"/>
+          </a:effectRef>
+          <a:fontRef idx="minor">
+            <a:schemeClr val="tx1"/>
+          </a:fontRef>
+        </p:style>
+      </p:cxnSp>
+      <mc:AlternateContent xmlns:mc="http://schemas.openxmlformats.org/markup-compatibility/2006">
+        <mc:Choice xmlns:a14="http://schemas.microsoft.com/office/drawing/2010/main" Requires="a14">
+          <p:sp>
+            <p:nvSpPr>
+              <p:cNvPr id="51" name="TextBox 50">
+                <a:extLst>
+                  <a:ext uri="{FF2B5EF4-FFF2-40B4-BE49-F238E27FC236}">
+                    <a16:creationId xmlns:a16="http://schemas.microsoft.com/office/drawing/2014/main" id="{648CDB82-5289-471D-987A-4853AB9F45CD}"/>
+                  </a:ext>
+                </a:extLst>
+              </p:cNvPr>
+              <p:cNvSpPr txBox="1"/>
+              <p:nvPr/>
+            </p:nvSpPr>
+            <p:spPr>
+              <a:xfrm>
+                <a:off x="3742086" y="3207239"/>
+                <a:ext cx="2258568" cy="410369"/>
+              </a:xfrm>
+              <a:prstGeom prst="rect">
+                <a:avLst/>
+              </a:prstGeom>
+              <a:noFill/>
+            </p:spPr>
+            <p:txBody>
+              <a:bodyPr wrap="square" rtlCol="0">
+                <a:spAutoFit/>
+              </a:bodyPr>
+              <a:lstStyle/>
+              <a:p>
+                <a14:m>
+                  <m:oMathPara xmlns:m="http://schemas.openxmlformats.org/officeDocument/2006/math">
+                    <m:oMathParaPr>
+                      <m:jc m:val="centerGroup"/>
+                    </m:oMathParaPr>
+                    <m:oMath xmlns:m="http://schemas.openxmlformats.org/officeDocument/2006/math">
+                      <m:r>
+                        <a:rPr lang="en-US" sz="1100" b="1" i="1" smtClean="0">
+                          <a:effectLst>
+                            <a:outerShdw blurRad="38100" dist="38100" dir="2700000" algn="tl">
+                              <a:srgbClr val="000000">
+                                <a:alpha val="43137"/>
+                              </a:srgbClr>
+                            </a:outerShdw>
+                          </a:effectLst>
+                          <a:latin typeface="Cambria Math" panose="02040503050406030204" pitchFamily="18" charset="0"/>
+                          <a:ea typeface="Cambria Math" panose="02040503050406030204" pitchFamily="18" charset="0"/>
+                        </a:rPr>
+                        <m:t>∆</m:t>
+                      </m:r>
+                      <m:r>
+                        <a:rPr lang="en-US" sz="1100" b="1" i="1" smtClean="0">
+                          <a:effectLst>
+                            <a:outerShdw blurRad="38100" dist="38100" dir="2700000" algn="tl">
+                              <a:srgbClr val="000000">
+                                <a:alpha val="43137"/>
+                              </a:srgbClr>
+                            </a:outerShdw>
+                          </a:effectLst>
+                          <a:latin typeface="Cambria Math" panose="02040503050406030204" pitchFamily="18" charset="0"/>
+                          <a:ea typeface="Cambria Math" panose="02040503050406030204" pitchFamily="18" charset="0"/>
+                        </a:rPr>
+                        <m:t>𝒙</m:t>
+                      </m:r>
+                      <m:r>
+                        <a:rPr lang="en-US" sz="1100" b="1" i="1" smtClean="0">
+                          <a:effectLst>
+                            <a:outerShdw blurRad="38100" dist="38100" dir="2700000" algn="tl">
+                              <a:srgbClr val="000000">
+                                <a:alpha val="43137"/>
+                              </a:srgbClr>
+                            </a:outerShdw>
+                          </a:effectLst>
+                          <a:latin typeface="Cambria Math" panose="02040503050406030204" pitchFamily="18" charset="0"/>
+                          <a:ea typeface="Cambria Math" panose="02040503050406030204" pitchFamily="18" charset="0"/>
+                        </a:rPr>
+                        <m:t>= </m:t>
+                      </m:r>
+                      <m:f>
+                        <m:fPr>
+                          <m:ctrlPr>
+                            <a:rPr lang="en-US" sz="1100" b="1" i="1" smtClean="0">
+                              <a:effectLst>
+                                <a:outerShdw blurRad="38100" dist="38100" dir="2700000" algn="tl">
+                                  <a:srgbClr val="000000">
+                                    <a:alpha val="43137"/>
+                                  </a:srgbClr>
+                                </a:outerShdw>
+                              </a:effectLst>
+                              <a:latin typeface="Cambria Math" panose="02040503050406030204" pitchFamily="18" charset="0"/>
+                            </a:rPr>
+                          </m:ctrlPr>
+                        </m:fPr>
+                        <m:num>
+                          <m:r>
+                            <a:rPr lang="en-US" sz="1100" b="1" i="1" smtClean="0">
+                              <a:effectLst>
+                                <a:outerShdw blurRad="38100" dist="38100" dir="2700000" algn="tl">
+                                  <a:srgbClr val="000000">
+                                    <a:alpha val="43137"/>
+                                  </a:srgbClr>
+                                </a:outerShdw>
+                              </a:effectLst>
+                              <a:latin typeface="Cambria Math" panose="02040503050406030204" pitchFamily="18" charset="0"/>
+                            </a:rPr>
+                            <m:t>𝟏</m:t>
+                          </m:r>
+                        </m:num>
+                        <m:den>
+                          <m:r>
+                            <a:rPr lang="en-US" sz="1100" b="1" i="1" smtClean="0">
+                              <a:effectLst>
+                                <a:outerShdw blurRad="38100" dist="38100" dir="2700000" algn="tl">
+                                  <a:srgbClr val="000000">
+                                    <a:alpha val="43137"/>
+                                  </a:srgbClr>
+                                </a:outerShdw>
+                              </a:effectLst>
+                              <a:latin typeface="Cambria Math" panose="02040503050406030204" pitchFamily="18" charset="0"/>
+                            </a:rPr>
+                            <m:t>𝟔</m:t>
+                          </m:r>
+                        </m:den>
+                      </m:f>
+                      <m:r>
+                        <a:rPr lang="en-US" sz="1100" b="1" i="1" smtClean="0">
+                          <a:effectLst>
+                            <a:outerShdw blurRad="38100" dist="38100" dir="2700000" algn="tl">
+                              <a:srgbClr val="000000">
+                                <a:alpha val="43137"/>
+                              </a:srgbClr>
+                            </a:outerShdw>
+                          </a:effectLst>
+                          <a:latin typeface="Cambria Math" panose="02040503050406030204" pitchFamily="18" charset="0"/>
+                        </a:rPr>
+                        <m:t>(</m:t>
+                      </m:r>
+                      <m:sSub>
+                        <m:sSubPr>
+                          <m:ctrlPr>
+                            <a:rPr lang="en-US" sz="1100" b="1" i="1" smtClean="0">
+                              <a:effectLst>
+                                <a:outerShdw blurRad="38100" dist="38100" dir="2700000" algn="tl">
+                                  <a:srgbClr val="000000">
+                                    <a:alpha val="43137"/>
+                                  </a:srgbClr>
+                                </a:outerShdw>
+                              </a:effectLst>
+                              <a:latin typeface="Cambria Math" panose="02040503050406030204" pitchFamily="18" charset="0"/>
+                            </a:rPr>
+                          </m:ctrlPr>
+                        </m:sSubPr>
+                        <m:e>
+                          <m:r>
+                            <a:rPr lang="en-US" sz="1100" b="1" i="1" smtClean="0">
+                              <a:effectLst>
+                                <a:outerShdw blurRad="38100" dist="38100" dir="2700000" algn="tl">
+                                  <a:srgbClr val="000000">
+                                    <a:alpha val="43137"/>
+                                  </a:srgbClr>
+                                </a:outerShdw>
+                              </a:effectLst>
+                              <a:latin typeface="Cambria Math" panose="02040503050406030204" pitchFamily="18" charset="0"/>
+                            </a:rPr>
+                            <m:t>𝒌</m:t>
+                          </m:r>
+                        </m:e>
+                        <m:sub>
+                          <m:r>
+                            <a:rPr lang="en-US" sz="1100" b="1" i="1" smtClean="0">
+                              <a:effectLst>
+                                <a:outerShdw blurRad="38100" dist="38100" dir="2700000" algn="tl">
+                                  <a:srgbClr val="000000">
+                                    <a:alpha val="43137"/>
+                                  </a:srgbClr>
+                                </a:outerShdw>
+                              </a:effectLst>
+                              <a:latin typeface="Cambria Math" panose="02040503050406030204" pitchFamily="18" charset="0"/>
+                            </a:rPr>
+                            <m:t>𝟏</m:t>
+                          </m:r>
+                        </m:sub>
+                      </m:sSub>
+                      <m:r>
+                        <a:rPr lang="en-US" sz="1100" b="1" i="1" smtClean="0">
+                          <a:effectLst>
+                            <a:outerShdw blurRad="38100" dist="38100" dir="2700000" algn="tl">
+                              <a:srgbClr val="000000">
+                                <a:alpha val="43137"/>
+                              </a:srgbClr>
+                            </a:outerShdw>
+                          </a:effectLst>
+                          <a:latin typeface="Cambria Math" panose="02040503050406030204" pitchFamily="18" charset="0"/>
+                        </a:rPr>
+                        <m:t>+</m:t>
+                      </m:r>
+                      <m:r>
+                        <a:rPr lang="en-US" sz="1100" b="1" i="1" smtClean="0">
+                          <a:effectLst>
+                            <a:outerShdw blurRad="38100" dist="38100" dir="2700000" algn="tl">
+                              <a:srgbClr val="000000">
+                                <a:alpha val="43137"/>
+                              </a:srgbClr>
+                            </a:outerShdw>
+                          </a:effectLst>
+                          <a:latin typeface="Cambria Math" panose="02040503050406030204" pitchFamily="18" charset="0"/>
+                        </a:rPr>
+                        <m:t>𝟐</m:t>
+                      </m:r>
+                      <m:sSub>
+                        <m:sSubPr>
+                          <m:ctrlPr>
+                            <a:rPr lang="en-US" sz="1100" b="1" i="1" smtClean="0">
+                              <a:effectLst>
+                                <a:outerShdw blurRad="38100" dist="38100" dir="2700000" algn="tl">
+                                  <a:srgbClr val="000000">
+                                    <a:alpha val="43137"/>
+                                  </a:srgbClr>
+                                </a:outerShdw>
+                              </a:effectLst>
+                              <a:latin typeface="Cambria Math" panose="02040503050406030204" pitchFamily="18" charset="0"/>
+                            </a:rPr>
+                          </m:ctrlPr>
+                        </m:sSubPr>
+                        <m:e>
+                          <m:r>
+                            <a:rPr lang="en-US" sz="1100" b="1" i="1" smtClean="0">
+                              <a:effectLst>
+                                <a:outerShdw blurRad="38100" dist="38100" dir="2700000" algn="tl">
+                                  <a:srgbClr val="000000">
+                                    <a:alpha val="43137"/>
+                                  </a:srgbClr>
+                                </a:outerShdw>
+                              </a:effectLst>
+                              <a:latin typeface="Cambria Math" panose="02040503050406030204" pitchFamily="18" charset="0"/>
+                            </a:rPr>
+                            <m:t>𝒌</m:t>
+                          </m:r>
+                        </m:e>
+                        <m:sub>
+                          <m:r>
+                            <a:rPr lang="en-US" sz="1100" b="1" i="1" smtClean="0">
+                              <a:effectLst>
+                                <a:outerShdw blurRad="38100" dist="38100" dir="2700000" algn="tl">
+                                  <a:srgbClr val="000000">
+                                    <a:alpha val="43137"/>
+                                  </a:srgbClr>
+                                </a:outerShdw>
+                              </a:effectLst>
+                              <a:latin typeface="Cambria Math" panose="02040503050406030204" pitchFamily="18" charset="0"/>
+                            </a:rPr>
+                            <m:t>𝟐</m:t>
+                          </m:r>
+                        </m:sub>
+                      </m:sSub>
+                      <m:r>
+                        <a:rPr lang="en-US" sz="1100" b="1" i="1" smtClean="0">
+                          <a:effectLst>
+                            <a:outerShdw blurRad="38100" dist="38100" dir="2700000" algn="tl">
+                              <a:srgbClr val="000000">
+                                <a:alpha val="43137"/>
+                              </a:srgbClr>
+                            </a:outerShdw>
+                          </a:effectLst>
+                          <a:latin typeface="Cambria Math" panose="02040503050406030204" pitchFamily="18" charset="0"/>
+                        </a:rPr>
+                        <m:t>+</m:t>
+                      </m:r>
+                      <m:r>
+                        <a:rPr lang="en-US" sz="1100" b="1" i="1" smtClean="0">
+                          <a:effectLst>
+                            <a:outerShdw blurRad="38100" dist="38100" dir="2700000" algn="tl">
+                              <a:srgbClr val="000000">
+                                <a:alpha val="43137"/>
+                              </a:srgbClr>
+                            </a:outerShdw>
+                          </a:effectLst>
+                          <a:latin typeface="Cambria Math" panose="02040503050406030204" pitchFamily="18" charset="0"/>
+                        </a:rPr>
+                        <m:t>𝟐</m:t>
+                      </m:r>
+                      <m:sSub>
+                        <m:sSubPr>
+                          <m:ctrlPr>
+                            <a:rPr lang="en-US" sz="1100" b="1" i="1" smtClean="0">
+                              <a:effectLst>
+                                <a:outerShdw blurRad="38100" dist="38100" dir="2700000" algn="tl">
+                                  <a:srgbClr val="000000">
+                                    <a:alpha val="43137"/>
+                                  </a:srgbClr>
+                                </a:outerShdw>
+                              </a:effectLst>
+                              <a:latin typeface="Cambria Math" panose="02040503050406030204" pitchFamily="18" charset="0"/>
+                            </a:rPr>
+                          </m:ctrlPr>
+                        </m:sSubPr>
+                        <m:e>
+                          <m:r>
+                            <a:rPr lang="en-US" sz="1100" b="1" i="1" smtClean="0">
+                              <a:effectLst>
+                                <a:outerShdw blurRad="38100" dist="38100" dir="2700000" algn="tl">
+                                  <a:srgbClr val="000000">
+                                    <a:alpha val="43137"/>
+                                  </a:srgbClr>
+                                </a:outerShdw>
+                              </a:effectLst>
+                              <a:latin typeface="Cambria Math" panose="02040503050406030204" pitchFamily="18" charset="0"/>
+                            </a:rPr>
+                            <m:t>𝒌</m:t>
+                          </m:r>
+                        </m:e>
+                        <m:sub>
+                          <m:r>
+                            <a:rPr lang="en-US" sz="1100" b="1" i="1" smtClean="0">
+                              <a:effectLst>
+                                <a:outerShdw blurRad="38100" dist="38100" dir="2700000" algn="tl">
+                                  <a:srgbClr val="000000">
+                                    <a:alpha val="43137"/>
+                                  </a:srgbClr>
+                                </a:outerShdw>
+                              </a:effectLst>
+                              <a:latin typeface="Cambria Math" panose="02040503050406030204" pitchFamily="18" charset="0"/>
+                            </a:rPr>
+                            <m:t>𝟑</m:t>
+                          </m:r>
+                        </m:sub>
+                      </m:sSub>
+                      <m:r>
+                        <a:rPr lang="en-US" sz="1100" b="1" i="1" smtClean="0">
+                          <a:effectLst>
+                            <a:outerShdw blurRad="38100" dist="38100" dir="2700000" algn="tl">
+                              <a:srgbClr val="000000">
+                                <a:alpha val="43137"/>
+                              </a:srgbClr>
+                            </a:outerShdw>
+                          </a:effectLst>
+                          <a:latin typeface="Cambria Math" panose="02040503050406030204" pitchFamily="18" charset="0"/>
+                        </a:rPr>
+                        <m:t>+</m:t>
+                      </m:r>
+                      <m:sSub>
+                        <m:sSubPr>
+                          <m:ctrlPr>
+                            <a:rPr lang="en-US" sz="1100" b="1" i="1" smtClean="0">
+                              <a:effectLst>
+                                <a:outerShdw blurRad="38100" dist="38100" dir="2700000" algn="tl">
+                                  <a:srgbClr val="000000">
+                                    <a:alpha val="43137"/>
+                                  </a:srgbClr>
+                                </a:outerShdw>
+                              </a:effectLst>
+                              <a:latin typeface="Cambria Math" panose="02040503050406030204" pitchFamily="18" charset="0"/>
+                            </a:rPr>
+                          </m:ctrlPr>
+                        </m:sSubPr>
+                        <m:e>
+                          <m:r>
+                            <a:rPr lang="en-US" sz="1100" b="1" i="1" smtClean="0">
+                              <a:effectLst>
+                                <a:outerShdw blurRad="38100" dist="38100" dir="2700000" algn="tl">
+                                  <a:srgbClr val="000000">
+                                    <a:alpha val="43137"/>
+                                  </a:srgbClr>
+                                </a:outerShdw>
+                              </a:effectLst>
+                              <a:latin typeface="Cambria Math" panose="02040503050406030204" pitchFamily="18" charset="0"/>
+                            </a:rPr>
+                            <m:t>𝒌</m:t>
+                          </m:r>
+                        </m:e>
+                        <m:sub>
+                          <m:r>
+                            <a:rPr lang="en-US" sz="1100" b="1" i="1" smtClean="0">
+                              <a:effectLst>
+                                <a:outerShdw blurRad="38100" dist="38100" dir="2700000" algn="tl">
+                                  <a:srgbClr val="000000">
+                                    <a:alpha val="43137"/>
+                                  </a:srgbClr>
+                                </a:outerShdw>
+                              </a:effectLst>
+                              <a:latin typeface="Cambria Math" panose="02040503050406030204" pitchFamily="18" charset="0"/>
+                            </a:rPr>
+                            <m:t>𝟒</m:t>
+                          </m:r>
+                        </m:sub>
+                      </m:sSub>
+                      <m:r>
+                        <a:rPr lang="en-US" sz="1100" b="1" i="1" smtClean="0">
+                          <a:effectLst>
+                            <a:outerShdw blurRad="38100" dist="38100" dir="2700000" algn="tl">
+                              <a:srgbClr val="000000">
+                                <a:alpha val="43137"/>
+                              </a:srgbClr>
+                            </a:outerShdw>
+                          </a:effectLst>
+                          <a:latin typeface="Cambria Math" panose="02040503050406030204" pitchFamily="18" charset="0"/>
+                        </a:rPr>
+                        <m:t>)</m:t>
+                      </m:r>
+                      <m:r>
+                        <a:rPr lang="en-US" sz="1100" b="1" i="1" smtClean="0">
+                          <a:effectLst>
+                            <a:outerShdw blurRad="38100" dist="38100" dir="2700000" algn="tl">
+                              <a:srgbClr val="000000">
+                                <a:alpha val="43137"/>
+                              </a:srgbClr>
+                            </a:outerShdw>
+                          </a:effectLst>
+                          <a:latin typeface="Cambria Math" panose="02040503050406030204" pitchFamily="18" charset="0"/>
+                          <a:ea typeface="Cambria Math" panose="02040503050406030204" pitchFamily="18" charset="0"/>
+                        </a:rPr>
+                        <m:t>∆</m:t>
+                      </m:r>
+                      <m:r>
+                        <a:rPr lang="en-US" sz="1100" b="1" i="1" smtClean="0">
+                          <a:effectLst>
+                            <a:outerShdw blurRad="38100" dist="38100" dir="2700000" algn="tl">
+                              <a:srgbClr val="000000">
+                                <a:alpha val="43137"/>
+                              </a:srgbClr>
+                            </a:outerShdw>
+                          </a:effectLst>
+                          <a:latin typeface="Cambria Math" panose="02040503050406030204" pitchFamily="18" charset="0"/>
+                          <a:ea typeface="Cambria Math" panose="02040503050406030204" pitchFamily="18" charset="0"/>
+                        </a:rPr>
+                        <m:t>𝒕</m:t>
+                      </m:r>
+                    </m:oMath>
+                  </m:oMathPara>
+                </a14:m>
+                <a:endParaRPr lang="en-US" sz="1600" b="1" i="1" dirty="0">
+                  <a:effectLst>
+                    <a:outerShdw blurRad="38100" dist="38100" dir="2700000" algn="tl">
+                      <a:srgbClr val="000000">
+                        <a:alpha val="43137"/>
+                      </a:srgbClr>
+                    </a:outerShdw>
+                  </a:effectLst>
+                </a:endParaRPr>
+              </a:p>
+            </p:txBody>
+          </p:sp>
+        </mc:Choice>
+        <mc:Fallback>
+          <p:sp>
+            <p:nvSpPr>
+              <p:cNvPr id="51" name="TextBox 50">
+                <a:extLst>
+                  <a:ext uri="{FF2B5EF4-FFF2-40B4-BE49-F238E27FC236}">
+                    <a16:creationId xmlns:a16="http://schemas.microsoft.com/office/drawing/2014/main" id="{648CDB82-5289-471D-987A-4853AB9F45CD}"/>
+                  </a:ext>
+                </a:extLst>
+              </p:cNvPr>
+              <p:cNvSpPr txBox="1">
+                <a:spLocks noRot="1" noChangeAspect="1" noMove="1" noResize="1" noEditPoints="1" noAdjustHandles="1" noChangeArrowheads="1" noChangeShapeType="1" noTextEdit="1"/>
+              </p:cNvSpPr>
+              <p:nvPr/>
+            </p:nvSpPr>
+            <p:spPr>
+              <a:xfrm>
+                <a:off x="3742086" y="3207239"/>
+                <a:ext cx="2258568" cy="410369"/>
+              </a:xfrm>
+              <a:prstGeom prst="rect">
+                <a:avLst/>
+              </a:prstGeom>
+              <a:blipFill>
+                <a:blip r:embed="rId3"/>
+                <a:stretch>
+                  <a:fillRect b="-7463"/>
+                </a:stretch>
+              </a:blipFill>
+            </p:spPr>
+            <p:txBody>
+              <a:bodyPr/>
+              <a:lstStyle/>
+              <a:p>
+                <a:r>
+                  <a:rPr lang="en-US">
+                    <a:noFill/>
+                  </a:rPr>
+                  <a:t> </a:t>
+                </a:r>
+              </a:p>
+            </p:txBody>
+          </p:sp>
+        </mc:Fallback>
+      </mc:AlternateContent>
+      <mc:AlternateContent xmlns:mc="http://schemas.openxmlformats.org/markup-compatibility/2006">
+        <mc:Choice xmlns:a14="http://schemas.microsoft.com/office/drawing/2010/main" Requires="a14">
+          <p:sp>
+            <p:nvSpPr>
+              <p:cNvPr id="52" name="TextBox 51">
+                <a:extLst>
+                  <a:ext uri="{FF2B5EF4-FFF2-40B4-BE49-F238E27FC236}">
+                    <a16:creationId xmlns:a16="http://schemas.microsoft.com/office/drawing/2014/main" id="{B09AE6E2-C75C-4BBD-B8A0-198FFE3DF832}"/>
+                  </a:ext>
+                </a:extLst>
+              </p:cNvPr>
+              <p:cNvSpPr txBox="1"/>
+              <p:nvPr/>
+            </p:nvSpPr>
+            <p:spPr>
+              <a:xfrm>
+                <a:off x="3923251" y="3568127"/>
+                <a:ext cx="2090295" cy="707886"/>
+              </a:xfrm>
+              <a:prstGeom prst="rect">
+                <a:avLst/>
+              </a:prstGeom>
+              <a:noFill/>
+            </p:spPr>
+            <p:txBody>
+              <a:bodyPr wrap="square" rtlCol="0">
+                <a:spAutoFit/>
+              </a:bodyPr>
+              <a:lstStyle/>
+              <a:p>
+                <a:pPr/>
+                <a14:m>
+                  <m:oMathPara xmlns:m="http://schemas.openxmlformats.org/officeDocument/2006/math">
+                    <m:oMathParaPr>
+                      <m:jc m:val="left"/>
+                    </m:oMathParaPr>
+                    <m:oMath xmlns:m="http://schemas.openxmlformats.org/officeDocument/2006/math">
+                      <m:sSub>
+                        <m:sSubPr>
+                          <m:ctrlPr>
+                            <a:rPr lang="en-US" sz="1000" b="1" i="1" smtClean="0">
+                              <a:solidFill>
+                                <a:schemeClr val="tx1"/>
+                              </a:solidFill>
+                              <a:effectLst>
+                                <a:outerShdw blurRad="38100" dist="38100" dir="2700000" algn="tl">
+                                  <a:srgbClr val="000000">
+                                    <a:alpha val="43137"/>
+                                  </a:srgbClr>
+                                </a:outerShdw>
+                              </a:effectLst>
+                              <a:latin typeface="Cambria Math" panose="02040503050406030204" pitchFamily="18" charset="0"/>
+                              <a:ea typeface="Cambria Math" panose="02040503050406030204" pitchFamily="18" charset="0"/>
+                            </a:rPr>
+                          </m:ctrlPr>
+                        </m:sSubPr>
+                        <m:e>
+                          <m:r>
+                            <a:rPr lang="en-US" sz="1000" b="1" i="1" smtClean="0">
+                              <a:solidFill>
+                                <a:schemeClr val="tx1"/>
+                              </a:solidFill>
+                              <a:effectLst>
+                                <a:outerShdw blurRad="38100" dist="38100" dir="2700000" algn="tl">
+                                  <a:srgbClr val="000000">
+                                    <a:alpha val="43137"/>
+                                  </a:srgbClr>
+                                </a:outerShdw>
+                              </a:effectLst>
+                              <a:latin typeface="Cambria Math" panose="02040503050406030204" pitchFamily="18" charset="0"/>
+                              <a:ea typeface="Cambria Math" panose="02040503050406030204" pitchFamily="18" charset="0"/>
+                            </a:rPr>
+                            <m:t>𝒌</m:t>
+                          </m:r>
+                        </m:e>
+                        <m:sub>
+                          <m:r>
+                            <a:rPr lang="en-US" sz="1000" b="1" i="1" smtClean="0">
+                              <a:solidFill>
+                                <a:schemeClr val="tx1"/>
+                              </a:solidFill>
+                              <a:effectLst>
+                                <a:outerShdw blurRad="38100" dist="38100" dir="2700000" algn="tl">
+                                  <a:srgbClr val="000000">
+                                    <a:alpha val="43137"/>
+                                  </a:srgbClr>
+                                </a:outerShdw>
+                              </a:effectLst>
+                              <a:latin typeface="Cambria Math" panose="02040503050406030204" pitchFamily="18" charset="0"/>
+                              <a:ea typeface="Cambria Math" panose="02040503050406030204" pitchFamily="18" charset="0"/>
+                            </a:rPr>
+                            <m:t>𝟏</m:t>
+                          </m:r>
+                        </m:sub>
+                      </m:sSub>
+                      <m:r>
+                        <a:rPr lang="en-US" sz="1000" b="1" i="1" smtClean="0">
+                          <a:solidFill>
+                            <a:schemeClr val="tx1"/>
+                          </a:solidFill>
+                          <a:effectLst>
+                            <a:outerShdw blurRad="38100" dist="38100" dir="2700000" algn="tl">
+                              <a:srgbClr val="000000">
+                                <a:alpha val="43137"/>
+                              </a:srgbClr>
+                            </a:outerShdw>
+                          </a:effectLst>
+                          <a:latin typeface="Cambria Math" panose="02040503050406030204" pitchFamily="18" charset="0"/>
+                          <a:ea typeface="Cambria Math" panose="02040503050406030204" pitchFamily="18" charset="0"/>
+                        </a:rPr>
+                        <m:t>=</m:t>
+                      </m:r>
+                      <m:r>
+                        <a:rPr lang="en-US" sz="1000" b="1" i="1" smtClean="0">
+                          <a:solidFill>
+                            <a:schemeClr val="tx1"/>
+                          </a:solidFill>
+                          <a:effectLst>
+                            <a:outerShdw blurRad="38100" dist="38100" dir="2700000" algn="tl">
+                              <a:srgbClr val="000000">
+                                <a:alpha val="43137"/>
+                              </a:srgbClr>
+                            </a:outerShdw>
+                          </a:effectLst>
+                          <a:latin typeface="Cambria Math" panose="02040503050406030204" pitchFamily="18" charset="0"/>
+                          <a:ea typeface="Cambria Math" panose="02040503050406030204" pitchFamily="18" charset="0"/>
+                        </a:rPr>
+                        <m:t>𝒇</m:t>
+                      </m:r>
+                      <m:d>
+                        <m:dPr>
+                          <m:ctrlPr>
+                            <a:rPr lang="en-US" sz="1000" b="1" i="1" smtClean="0">
+                              <a:solidFill>
+                                <a:schemeClr val="tx1"/>
+                              </a:solidFill>
+                              <a:effectLst>
+                                <a:outerShdw blurRad="38100" dist="38100" dir="2700000" algn="tl">
+                                  <a:srgbClr val="000000">
+                                    <a:alpha val="43137"/>
+                                  </a:srgbClr>
+                                </a:outerShdw>
+                              </a:effectLst>
+                              <a:latin typeface="Cambria Math" panose="02040503050406030204" pitchFamily="18" charset="0"/>
+                              <a:ea typeface="Cambria Math" panose="02040503050406030204" pitchFamily="18" charset="0"/>
+                            </a:rPr>
+                          </m:ctrlPr>
+                        </m:dPr>
+                        <m:e>
+                          <m:r>
+                            <a:rPr lang="en-US" sz="1000" b="1" i="1" smtClean="0">
+                              <a:solidFill>
+                                <a:schemeClr val="tx1"/>
+                              </a:solidFill>
+                              <a:effectLst>
+                                <a:outerShdw blurRad="38100" dist="38100" dir="2700000" algn="tl">
+                                  <a:srgbClr val="000000">
+                                    <a:alpha val="43137"/>
+                                  </a:srgbClr>
+                                </a:outerShdw>
+                              </a:effectLst>
+                              <a:latin typeface="Cambria Math" panose="02040503050406030204" pitchFamily="18" charset="0"/>
+                              <a:ea typeface="Cambria Math" panose="02040503050406030204" pitchFamily="18" charset="0"/>
+                            </a:rPr>
+                            <m:t>𝒕</m:t>
+                          </m:r>
+                          <m:r>
+                            <a:rPr lang="en-US" sz="1000" b="1" i="1" smtClean="0">
+                              <a:solidFill>
+                                <a:schemeClr val="tx1"/>
+                              </a:solidFill>
+                              <a:effectLst>
+                                <a:outerShdw blurRad="38100" dist="38100" dir="2700000" algn="tl">
+                                  <a:srgbClr val="000000">
+                                    <a:alpha val="43137"/>
+                                  </a:srgbClr>
+                                </a:outerShdw>
+                              </a:effectLst>
+                              <a:latin typeface="Cambria Math" panose="02040503050406030204" pitchFamily="18" charset="0"/>
+                              <a:ea typeface="Cambria Math" panose="02040503050406030204" pitchFamily="18" charset="0"/>
+                            </a:rPr>
+                            <m:t>+</m:t>
+                          </m:r>
+                          <m:r>
+                            <a:rPr lang="en-US" sz="1000" b="1" i="1" smtClean="0">
+                              <a:solidFill>
+                                <a:schemeClr val="tx1"/>
+                              </a:solidFill>
+                              <a:effectLst>
+                                <a:outerShdw blurRad="38100" dist="38100" dir="2700000" algn="tl">
+                                  <a:srgbClr val="000000">
+                                    <a:alpha val="43137"/>
+                                  </a:srgbClr>
+                                </a:outerShdw>
+                              </a:effectLst>
+                              <a:latin typeface="Cambria Math" panose="02040503050406030204" pitchFamily="18" charset="0"/>
+                              <a:ea typeface="Cambria Math" panose="02040503050406030204" pitchFamily="18" charset="0"/>
+                            </a:rPr>
+                            <m:t>𝒙</m:t>
+                          </m:r>
+                        </m:e>
+                      </m:d>
+                    </m:oMath>
+                  </m:oMathPara>
+                </a14:m>
+                <a:endParaRPr lang="en-US" sz="1000" b="1" i="1" dirty="0">
+                  <a:solidFill>
+                    <a:schemeClr val="tx1"/>
+                  </a:solidFill>
+                  <a:effectLst>
+                    <a:outerShdw blurRad="38100" dist="38100" dir="2700000" algn="tl">
+                      <a:srgbClr val="000000">
+                        <a:alpha val="43137"/>
+                      </a:srgbClr>
+                    </a:outerShdw>
+                  </a:effectLst>
+                  <a:ea typeface="Cambria Math" panose="02040503050406030204" pitchFamily="18" charset="0"/>
+                </a:endParaRPr>
+              </a:p>
+              <a:p>
+                <a:pPr/>
+                <a14:m>
+                  <m:oMathPara xmlns:m="http://schemas.openxmlformats.org/officeDocument/2006/math">
+                    <m:oMathParaPr>
+                      <m:jc m:val="left"/>
+                    </m:oMathParaPr>
+                    <m:oMath xmlns:m="http://schemas.openxmlformats.org/officeDocument/2006/math">
+                      <m:sSub>
+                        <m:sSubPr>
+                          <m:ctrlPr>
+                            <a:rPr lang="en-US" sz="1000" b="1" i="1" smtClean="0">
+                              <a:solidFill>
+                                <a:schemeClr val="tx1"/>
+                              </a:solidFill>
+                              <a:effectLst>
+                                <a:outerShdw blurRad="38100" dist="38100" dir="2700000" algn="tl">
+                                  <a:srgbClr val="000000">
+                                    <a:alpha val="43137"/>
+                                  </a:srgbClr>
+                                </a:outerShdw>
+                              </a:effectLst>
+                              <a:latin typeface="Cambria Math" panose="02040503050406030204" pitchFamily="18" charset="0"/>
+                            </a:rPr>
+                          </m:ctrlPr>
+                        </m:sSubPr>
+                        <m:e>
+                          <m:r>
+                            <a:rPr lang="en-US" sz="1000" b="1" i="1" smtClean="0">
+                              <a:solidFill>
+                                <a:schemeClr val="tx1"/>
+                              </a:solidFill>
+                              <a:effectLst>
+                                <a:outerShdw blurRad="38100" dist="38100" dir="2700000" algn="tl">
+                                  <a:srgbClr val="000000">
+                                    <a:alpha val="43137"/>
+                                  </a:srgbClr>
+                                </a:outerShdw>
+                              </a:effectLst>
+                              <a:latin typeface="Cambria Math" panose="02040503050406030204" pitchFamily="18" charset="0"/>
+                            </a:rPr>
+                            <m:t>𝒌</m:t>
+                          </m:r>
+                        </m:e>
+                        <m:sub>
+                          <m:r>
+                            <a:rPr lang="en-US" sz="1000" b="1" i="1" smtClean="0">
+                              <a:solidFill>
+                                <a:schemeClr val="tx1"/>
+                              </a:solidFill>
+                              <a:effectLst>
+                                <a:outerShdw blurRad="38100" dist="38100" dir="2700000" algn="tl">
+                                  <a:srgbClr val="000000">
+                                    <a:alpha val="43137"/>
+                                  </a:srgbClr>
+                                </a:outerShdw>
+                              </a:effectLst>
+                              <a:latin typeface="Cambria Math" panose="02040503050406030204" pitchFamily="18" charset="0"/>
+                            </a:rPr>
+                            <m:t>𝟐</m:t>
+                          </m:r>
+                        </m:sub>
+                      </m:sSub>
+                      <m:r>
+                        <a:rPr lang="en-US" sz="1000" b="1" i="1" smtClean="0">
+                          <a:solidFill>
+                            <a:schemeClr val="tx1"/>
+                          </a:solidFill>
+                          <a:effectLst>
+                            <a:outerShdw blurRad="38100" dist="38100" dir="2700000" algn="tl">
+                              <a:srgbClr val="000000">
+                                <a:alpha val="43137"/>
+                              </a:srgbClr>
+                            </a:outerShdw>
+                          </a:effectLst>
+                          <a:latin typeface="Cambria Math" panose="02040503050406030204" pitchFamily="18" charset="0"/>
+                        </a:rPr>
+                        <m:t>=</m:t>
+                      </m:r>
+                      <m:r>
+                        <a:rPr lang="en-US" sz="1000" b="1" i="1" smtClean="0">
+                          <a:solidFill>
+                            <a:schemeClr val="tx1"/>
+                          </a:solidFill>
+                          <a:effectLst>
+                            <a:outerShdw blurRad="38100" dist="38100" dir="2700000" algn="tl">
+                              <a:srgbClr val="000000">
+                                <a:alpha val="43137"/>
+                              </a:srgbClr>
+                            </a:outerShdw>
+                          </a:effectLst>
+                          <a:latin typeface="Cambria Math" panose="02040503050406030204" pitchFamily="18" charset="0"/>
+                        </a:rPr>
+                        <m:t>𝒇</m:t>
+                      </m:r>
+                      <m:r>
+                        <a:rPr lang="en-US" sz="1000" b="1" i="1" smtClean="0">
+                          <a:solidFill>
+                            <a:schemeClr val="tx1"/>
+                          </a:solidFill>
+                          <a:effectLst>
+                            <a:outerShdw blurRad="38100" dist="38100" dir="2700000" algn="tl">
+                              <a:srgbClr val="000000">
+                                <a:alpha val="43137"/>
+                              </a:srgbClr>
+                            </a:outerShdw>
+                          </a:effectLst>
+                          <a:latin typeface="Cambria Math" panose="02040503050406030204" pitchFamily="18" charset="0"/>
+                        </a:rPr>
+                        <m:t>(</m:t>
+                      </m:r>
+                      <m:r>
+                        <a:rPr lang="en-US" sz="1000" b="1" i="1" smtClean="0">
+                          <a:solidFill>
+                            <a:schemeClr val="tx1"/>
+                          </a:solidFill>
+                          <a:effectLst>
+                            <a:outerShdw blurRad="38100" dist="38100" dir="2700000" algn="tl">
+                              <a:srgbClr val="000000">
+                                <a:alpha val="43137"/>
+                              </a:srgbClr>
+                            </a:outerShdw>
+                          </a:effectLst>
+                          <a:latin typeface="Cambria Math" panose="02040503050406030204" pitchFamily="18" charset="0"/>
+                        </a:rPr>
+                        <m:t>𝒕</m:t>
+                      </m:r>
+                      <m:r>
+                        <a:rPr lang="en-US" sz="1000" b="1" i="1" smtClean="0">
+                          <a:solidFill>
+                            <a:schemeClr val="tx1"/>
+                          </a:solidFill>
+                          <a:effectLst>
+                            <a:outerShdw blurRad="38100" dist="38100" dir="2700000" algn="tl">
+                              <a:srgbClr val="000000">
+                                <a:alpha val="43137"/>
+                              </a:srgbClr>
+                            </a:outerShdw>
+                          </a:effectLst>
+                          <a:latin typeface="Cambria Math" panose="02040503050406030204" pitchFamily="18" charset="0"/>
+                        </a:rPr>
+                        <m:t>+</m:t>
+                      </m:r>
+                      <m:r>
+                        <a:rPr lang="en-US" sz="1000" b="1" i="1" smtClean="0">
+                          <a:solidFill>
+                            <a:schemeClr val="tx1"/>
+                          </a:solidFill>
+                          <a:effectLst>
+                            <a:outerShdw blurRad="38100" dist="38100" dir="2700000" algn="tl">
+                              <a:srgbClr val="000000">
+                                <a:alpha val="43137"/>
+                              </a:srgbClr>
+                            </a:outerShdw>
+                          </a:effectLst>
+                          <a:latin typeface="Cambria Math" panose="02040503050406030204" pitchFamily="18" charset="0"/>
+                        </a:rPr>
+                        <m:t>𝟎</m:t>
+                      </m:r>
+                      <m:r>
+                        <a:rPr lang="en-US" sz="1000" b="1" i="1" smtClean="0">
+                          <a:solidFill>
+                            <a:schemeClr val="tx1"/>
+                          </a:solidFill>
+                          <a:effectLst>
+                            <a:outerShdw blurRad="38100" dist="38100" dir="2700000" algn="tl">
+                              <a:srgbClr val="000000">
+                                <a:alpha val="43137"/>
+                              </a:srgbClr>
+                            </a:outerShdw>
+                          </a:effectLst>
+                          <a:latin typeface="Cambria Math" panose="02040503050406030204" pitchFamily="18" charset="0"/>
+                        </a:rPr>
+                        <m:t>.</m:t>
+                      </m:r>
+                      <m:r>
+                        <a:rPr lang="en-US" sz="1000" b="1" i="1" smtClean="0">
+                          <a:solidFill>
+                            <a:schemeClr val="tx1"/>
+                          </a:solidFill>
+                          <a:effectLst>
+                            <a:outerShdw blurRad="38100" dist="38100" dir="2700000" algn="tl">
+                              <a:srgbClr val="000000">
+                                <a:alpha val="43137"/>
+                              </a:srgbClr>
+                            </a:outerShdw>
+                          </a:effectLst>
+                          <a:latin typeface="Cambria Math" panose="02040503050406030204" pitchFamily="18" charset="0"/>
+                        </a:rPr>
+                        <m:t>𝟓</m:t>
+                      </m:r>
+                      <m:r>
+                        <a:rPr lang="en-US" sz="1000" b="1" i="1" smtClean="0">
+                          <a:solidFill>
+                            <a:schemeClr val="tx1"/>
+                          </a:solidFill>
+                          <a:effectLst>
+                            <a:outerShdw blurRad="38100" dist="38100" dir="2700000" algn="tl">
+                              <a:srgbClr val="000000">
+                                <a:alpha val="43137"/>
+                              </a:srgbClr>
+                            </a:outerShdw>
+                          </a:effectLst>
+                          <a:latin typeface="Cambria Math" panose="02040503050406030204" pitchFamily="18" charset="0"/>
+                          <a:ea typeface="Cambria Math" panose="02040503050406030204" pitchFamily="18" charset="0"/>
+                        </a:rPr>
+                        <m:t>∆</m:t>
+                      </m:r>
+                      <m:r>
+                        <a:rPr lang="en-US" sz="1000" b="1" i="1" smtClean="0">
+                          <a:solidFill>
+                            <a:schemeClr val="tx1"/>
+                          </a:solidFill>
+                          <a:effectLst>
+                            <a:outerShdw blurRad="38100" dist="38100" dir="2700000" algn="tl">
+                              <a:srgbClr val="000000">
+                                <a:alpha val="43137"/>
+                              </a:srgbClr>
+                            </a:outerShdw>
+                          </a:effectLst>
+                          <a:latin typeface="Cambria Math" panose="02040503050406030204" pitchFamily="18" charset="0"/>
+                          <a:ea typeface="Cambria Math" panose="02040503050406030204" pitchFamily="18" charset="0"/>
+                        </a:rPr>
+                        <m:t>𝒕</m:t>
+                      </m:r>
+                      <m:r>
+                        <a:rPr lang="en-US" sz="1000" b="1" i="1" smtClean="0">
+                          <a:solidFill>
+                            <a:schemeClr val="tx1"/>
+                          </a:solidFill>
+                          <a:effectLst>
+                            <a:outerShdw blurRad="38100" dist="38100" dir="2700000" algn="tl">
+                              <a:srgbClr val="000000">
+                                <a:alpha val="43137"/>
+                              </a:srgbClr>
+                            </a:outerShdw>
+                          </a:effectLst>
+                          <a:latin typeface="Cambria Math" panose="02040503050406030204" pitchFamily="18" charset="0"/>
+                          <a:ea typeface="Cambria Math" panose="02040503050406030204" pitchFamily="18" charset="0"/>
+                        </a:rPr>
+                        <m:t>,</m:t>
+                      </m:r>
+                      <m:r>
+                        <a:rPr lang="en-US" sz="1000" b="1" i="1" smtClean="0">
+                          <a:solidFill>
+                            <a:schemeClr val="tx1"/>
+                          </a:solidFill>
+                          <a:effectLst>
+                            <a:outerShdw blurRad="38100" dist="38100" dir="2700000" algn="tl">
+                              <a:srgbClr val="000000">
+                                <a:alpha val="43137"/>
+                              </a:srgbClr>
+                            </a:outerShdw>
+                          </a:effectLst>
+                          <a:latin typeface="Cambria Math" panose="02040503050406030204" pitchFamily="18" charset="0"/>
+                          <a:ea typeface="Cambria Math" panose="02040503050406030204" pitchFamily="18" charset="0"/>
+                        </a:rPr>
+                        <m:t>𝒙</m:t>
+                      </m:r>
+                      <m:r>
+                        <a:rPr lang="en-US" sz="1000" b="1" i="1" smtClean="0">
+                          <a:solidFill>
+                            <a:schemeClr val="tx1"/>
+                          </a:solidFill>
+                          <a:effectLst>
+                            <a:outerShdw blurRad="38100" dist="38100" dir="2700000" algn="tl">
+                              <a:srgbClr val="000000">
+                                <a:alpha val="43137"/>
+                              </a:srgbClr>
+                            </a:outerShdw>
+                          </a:effectLst>
+                          <a:latin typeface="Cambria Math" panose="02040503050406030204" pitchFamily="18" charset="0"/>
+                          <a:ea typeface="Cambria Math" panose="02040503050406030204" pitchFamily="18" charset="0"/>
+                        </a:rPr>
+                        <m:t>+</m:t>
+                      </m:r>
+                      <m:r>
+                        <a:rPr lang="en-US" sz="1000" b="1" i="1" smtClean="0">
+                          <a:solidFill>
+                            <a:schemeClr val="tx1"/>
+                          </a:solidFill>
+                          <a:effectLst>
+                            <a:outerShdw blurRad="38100" dist="38100" dir="2700000" algn="tl">
+                              <a:srgbClr val="000000">
+                                <a:alpha val="43137"/>
+                              </a:srgbClr>
+                            </a:outerShdw>
+                          </a:effectLst>
+                          <a:latin typeface="Cambria Math" panose="02040503050406030204" pitchFamily="18" charset="0"/>
+                          <a:ea typeface="Cambria Math" panose="02040503050406030204" pitchFamily="18" charset="0"/>
+                        </a:rPr>
+                        <m:t>𝟎</m:t>
+                      </m:r>
+                      <m:r>
+                        <a:rPr lang="en-US" sz="1000" b="1" i="1" smtClean="0">
+                          <a:solidFill>
+                            <a:schemeClr val="tx1"/>
+                          </a:solidFill>
+                          <a:effectLst>
+                            <a:outerShdw blurRad="38100" dist="38100" dir="2700000" algn="tl">
+                              <a:srgbClr val="000000">
+                                <a:alpha val="43137"/>
+                              </a:srgbClr>
+                            </a:outerShdw>
+                          </a:effectLst>
+                          <a:latin typeface="Cambria Math" panose="02040503050406030204" pitchFamily="18" charset="0"/>
+                          <a:ea typeface="Cambria Math" panose="02040503050406030204" pitchFamily="18" charset="0"/>
+                        </a:rPr>
+                        <m:t>.</m:t>
+                      </m:r>
+                      <m:r>
+                        <a:rPr lang="en-US" sz="1000" b="1" i="1" smtClean="0">
+                          <a:solidFill>
+                            <a:schemeClr val="tx1"/>
+                          </a:solidFill>
+                          <a:effectLst>
+                            <a:outerShdw blurRad="38100" dist="38100" dir="2700000" algn="tl">
+                              <a:srgbClr val="000000">
+                                <a:alpha val="43137"/>
+                              </a:srgbClr>
+                            </a:outerShdw>
+                          </a:effectLst>
+                          <a:latin typeface="Cambria Math" panose="02040503050406030204" pitchFamily="18" charset="0"/>
+                          <a:ea typeface="Cambria Math" panose="02040503050406030204" pitchFamily="18" charset="0"/>
+                        </a:rPr>
+                        <m:t>𝟓</m:t>
+                      </m:r>
+                      <m:r>
+                        <a:rPr lang="en-US" sz="1000" b="1" i="1" smtClean="0">
+                          <a:solidFill>
+                            <a:schemeClr val="tx1"/>
+                          </a:solidFill>
+                          <a:effectLst>
+                            <a:outerShdw blurRad="38100" dist="38100" dir="2700000" algn="tl">
+                              <a:srgbClr val="000000">
+                                <a:alpha val="43137"/>
+                              </a:srgbClr>
+                            </a:outerShdw>
+                          </a:effectLst>
+                          <a:latin typeface="Cambria Math" panose="02040503050406030204" pitchFamily="18" charset="0"/>
+                          <a:ea typeface="Cambria Math" panose="02040503050406030204" pitchFamily="18" charset="0"/>
+                        </a:rPr>
+                        <m:t>∆</m:t>
+                      </m:r>
+                      <m:r>
+                        <a:rPr lang="en-US" sz="1000" b="1" i="1" smtClean="0">
+                          <a:solidFill>
+                            <a:schemeClr val="tx1"/>
+                          </a:solidFill>
+                          <a:effectLst>
+                            <a:outerShdw blurRad="38100" dist="38100" dir="2700000" algn="tl">
+                              <a:srgbClr val="000000">
+                                <a:alpha val="43137"/>
+                              </a:srgbClr>
+                            </a:outerShdw>
+                          </a:effectLst>
+                          <a:latin typeface="Cambria Math" panose="02040503050406030204" pitchFamily="18" charset="0"/>
+                          <a:ea typeface="Cambria Math" panose="02040503050406030204" pitchFamily="18" charset="0"/>
+                        </a:rPr>
+                        <m:t>𝒕</m:t>
+                      </m:r>
+                      <m:sSub>
+                        <m:sSubPr>
+                          <m:ctrlPr>
+                            <a:rPr lang="en-US" sz="1000" b="1" i="1" smtClean="0">
+                              <a:solidFill>
+                                <a:schemeClr val="tx1"/>
+                              </a:solidFill>
+                              <a:effectLst>
+                                <a:outerShdw blurRad="38100" dist="38100" dir="2700000" algn="tl">
+                                  <a:srgbClr val="000000">
+                                    <a:alpha val="43137"/>
+                                  </a:srgbClr>
+                                </a:outerShdw>
+                              </a:effectLst>
+                              <a:latin typeface="Cambria Math" panose="02040503050406030204" pitchFamily="18" charset="0"/>
+                              <a:ea typeface="Cambria Math" panose="02040503050406030204" pitchFamily="18" charset="0"/>
+                            </a:rPr>
+                          </m:ctrlPr>
+                        </m:sSubPr>
+                        <m:e>
+                          <m:r>
+                            <a:rPr lang="en-US" sz="1000" b="1" i="1" smtClean="0">
+                              <a:solidFill>
+                                <a:schemeClr val="tx1"/>
+                              </a:solidFill>
+                              <a:effectLst>
+                                <a:outerShdw blurRad="38100" dist="38100" dir="2700000" algn="tl">
+                                  <a:srgbClr val="000000">
+                                    <a:alpha val="43137"/>
+                                  </a:srgbClr>
+                                </a:outerShdw>
+                              </a:effectLst>
+                              <a:latin typeface="Cambria Math" panose="02040503050406030204" pitchFamily="18" charset="0"/>
+                              <a:ea typeface="Cambria Math" panose="02040503050406030204" pitchFamily="18" charset="0"/>
+                            </a:rPr>
+                            <m:t>𝒌</m:t>
+                          </m:r>
+                        </m:e>
+                        <m:sub>
+                          <m:r>
+                            <a:rPr lang="en-US" sz="1000" b="1" i="1" smtClean="0">
+                              <a:solidFill>
+                                <a:schemeClr val="tx1"/>
+                              </a:solidFill>
+                              <a:effectLst>
+                                <a:outerShdw blurRad="38100" dist="38100" dir="2700000" algn="tl">
+                                  <a:srgbClr val="000000">
+                                    <a:alpha val="43137"/>
+                                  </a:srgbClr>
+                                </a:outerShdw>
+                              </a:effectLst>
+                              <a:latin typeface="Cambria Math" panose="02040503050406030204" pitchFamily="18" charset="0"/>
+                              <a:ea typeface="Cambria Math" panose="02040503050406030204" pitchFamily="18" charset="0"/>
+                            </a:rPr>
+                            <m:t>𝟏</m:t>
+                          </m:r>
+                        </m:sub>
+                      </m:sSub>
+                      <m:r>
+                        <a:rPr lang="en-US" sz="1000" b="1" i="1" smtClean="0">
+                          <a:solidFill>
+                            <a:schemeClr val="tx1"/>
+                          </a:solidFill>
+                          <a:effectLst>
+                            <a:outerShdw blurRad="38100" dist="38100" dir="2700000" algn="tl">
+                              <a:srgbClr val="000000">
+                                <a:alpha val="43137"/>
+                              </a:srgbClr>
+                            </a:outerShdw>
+                          </a:effectLst>
+                          <a:latin typeface="Cambria Math" panose="02040503050406030204" pitchFamily="18" charset="0"/>
+                        </a:rPr>
+                        <m:t>)</m:t>
+                      </m:r>
+                    </m:oMath>
+                  </m:oMathPara>
+                </a14:m>
+                <a:endParaRPr lang="en-US" sz="1000" b="1" i="1" dirty="0">
+                  <a:solidFill>
+                    <a:schemeClr val="tx1"/>
+                  </a:solidFill>
+                  <a:effectLst>
+                    <a:outerShdw blurRad="38100" dist="38100" dir="2700000" algn="tl">
+                      <a:srgbClr val="000000">
+                        <a:alpha val="43137"/>
+                      </a:srgbClr>
+                    </a:outerShdw>
+                  </a:effectLst>
+                  <a:ea typeface="Cambria Math" panose="02040503050406030204" pitchFamily="18" charset="0"/>
+                </a:endParaRPr>
+              </a:p>
+              <a:p>
+                <a:pPr/>
+                <a14:m>
+                  <m:oMathPara xmlns:m="http://schemas.openxmlformats.org/officeDocument/2006/math">
+                    <m:oMathParaPr>
+                      <m:jc m:val="left"/>
+                    </m:oMathParaPr>
+                    <m:oMath xmlns:m="http://schemas.openxmlformats.org/officeDocument/2006/math">
+                      <m:sSub>
+                        <m:sSubPr>
+                          <m:ctrlPr>
+                            <a:rPr lang="en-US" sz="1000" b="1" i="1" smtClean="0">
+                              <a:solidFill>
+                                <a:schemeClr val="tx1"/>
+                              </a:solidFill>
+                              <a:effectLst>
+                                <a:outerShdw blurRad="38100" dist="38100" dir="2700000" algn="tl">
+                                  <a:srgbClr val="000000">
+                                    <a:alpha val="43137"/>
+                                  </a:srgbClr>
+                                </a:outerShdw>
+                              </a:effectLst>
+                              <a:latin typeface="Cambria Math" panose="02040503050406030204" pitchFamily="18" charset="0"/>
+                            </a:rPr>
+                          </m:ctrlPr>
+                        </m:sSubPr>
+                        <m:e>
+                          <m:r>
+                            <a:rPr lang="en-US" sz="1000" b="1" i="1" smtClean="0">
+                              <a:solidFill>
+                                <a:schemeClr val="tx1"/>
+                              </a:solidFill>
+                              <a:effectLst>
+                                <a:outerShdw blurRad="38100" dist="38100" dir="2700000" algn="tl">
+                                  <a:srgbClr val="000000">
+                                    <a:alpha val="43137"/>
+                                  </a:srgbClr>
+                                </a:outerShdw>
+                              </a:effectLst>
+                              <a:latin typeface="Cambria Math" panose="02040503050406030204" pitchFamily="18" charset="0"/>
+                            </a:rPr>
+                            <m:t>𝒌</m:t>
+                          </m:r>
+                        </m:e>
+                        <m:sub>
+                          <m:r>
+                            <a:rPr lang="en-US" sz="1000" b="1" i="1" smtClean="0">
+                              <a:solidFill>
+                                <a:schemeClr val="tx1"/>
+                              </a:solidFill>
+                              <a:effectLst>
+                                <a:outerShdw blurRad="38100" dist="38100" dir="2700000" algn="tl">
+                                  <a:srgbClr val="000000">
+                                    <a:alpha val="43137"/>
+                                  </a:srgbClr>
+                                </a:outerShdw>
+                              </a:effectLst>
+                              <a:latin typeface="Cambria Math" panose="02040503050406030204" pitchFamily="18" charset="0"/>
+                            </a:rPr>
+                            <m:t>𝟑</m:t>
+                          </m:r>
+                        </m:sub>
+                      </m:sSub>
+                      <m:r>
+                        <a:rPr lang="en-US" sz="1000" b="1" i="1" smtClean="0">
+                          <a:solidFill>
+                            <a:schemeClr val="tx1"/>
+                          </a:solidFill>
+                          <a:effectLst>
+                            <a:outerShdw blurRad="38100" dist="38100" dir="2700000" algn="tl">
+                              <a:srgbClr val="000000">
+                                <a:alpha val="43137"/>
+                              </a:srgbClr>
+                            </a:outerShdw>
+                          </a:effectLst>
+                          <a:latin typeface="Cambria Math" panose="02040503050406030204" pitchFamily="18" charset="0"/>
+                        </a:rPr>
+                        <m:t>=</m:t>
+                      </m:r>
+                      <m:r>
+                        <a:rPr lang="en-US" sz="1000" b="1" i="1" smtClean="0">
+                          <a:solidFill>
+                            <a:schemeClr val="tx1"/>
+                          </a:solidFill>
+                          <a:effectLst>
+                            <a:outerShdw blurRad="38100" dist="38100" dir="2700000" algn="tl">
+                              <a:srgbClr val="000000">
+                                <a:alpha val="43137"/>
+                              </a:srgbClr>
+                            </a:outerShdw>
+                          </a:effectLst>
+                          <a:latin typeface="Cambria Math" panose="02040503050406030204" pitchFamily="18" charset="0"/>
+                        </a:rPr>
+                        <m:t>𝒇</m:t>
+                      </m:r>
+                      <m:r>
+                        <a:rPr lang="en-US" sz="1000" b="1" i="1" smtClean="0">
+                          <a:solidFill>
+                            <a:schemeClr val="tx1"/>
+                          </a:solidFill>
+                          <a:effectLst>
+                            <a:outerShdw blurRad="38100" dist="38100" dir="2700000" algn="tl">
+                              <a:srgbClr val="000000">
+                                <a:alpha val="43137"/>
+                              </a:srgbClr>
+                            </a:outerShdw>
+                          </a:effectLst>
+                          <a:latin typeface="Cambria Math" panose="02040503050406030204" pitchFamily="18" charset="0"/>
+                        </a:rPr>
+                        <m:t>(</m:t>
+                      </m:r>
+                      <m:r>
+                        <a:rPr lang="en-US" sz="1000" b="1" i="1" smtClean="0">
+                          <a:solidFill>
+                            <a:schemeClr val="tx1"/>
+                          </a:solidFill>
+                          <a:effectLst>
+                            <a:outerShdw blurRad="38100" dist="38100" dir="2700000" algn="tl">
+                              <a:srgbClr val="000000">
+                                <a:alpha val="43137"/>
+                              </a:srgbClr>
+                            </a:outerShdw>
+                          </a:effectLst>
+                          <a:latin typeface="Cambria Math" panose="02040503050406030204" pitchFamily="18" charset="0"/>
+                        </a:rPr>
+                        <m:t>𝒕</m:t>
+                      </m:r>
+                      <m:r>
+                        <a:rPr lang="en-US" sz="1000" b="1" i="1" smtClean="0">
+                          <a:solidFill>
+                            <a:schemeClr val="tx1"/>
+                          </a:solidFill>
+                          <a:effectLst>
+                            <a:outerShdw blurRad="38100" dist="38100" dir="2700000" algn="tl">
+                              <a:srgbClr val="000000">
+                                <a:alpha val="43137"/>
+                              </a:srgbClr>
+                            </a:outerShdw>
+                          </a:effectLst>
+                          <a:latin typeface="Cambria Math" panose="02040503050406030204" pitchFamily="18" charset="0"/>
+                        </a:rPr>
+                        <m:t>+</m:t>
+                      </m:r>
+                      <m:r>
+                        <a:rPr lang="en-US" sz="1000" b="1" i="1" smtClean="0">
+                          <a:solidFill>
+                            <a:schemeClr val="tx1"/>
+                          </a:solidFill>
+                          <a:effectLst>
+                            <a:outerShdw blurRad="38100" dist="38100" dir="2700000" algn="tl">
+                              <a:srgbClr val="000000">
+                                <a:alpha val="43137"/>
+                              </a:srgbClr>
+                            </a:outerShdw>
+                          </a:effectLst>
+                          <a:latin typeface="Cambria Math" panose="02040503050406030204" pitchFamily="18" charset="0"/>
+                        </a:rPr>
+                        <m:t>𝟎</m:t>
+                      </m:r>
+                      <m:r>
+                        <a:rPr lang="en-US" sz="1000" b="1" i="1" smtClean="0">
+                          <a:solidFill>
+                            <a:schemeClr val="tx1"/>
+                          </a:solidFill>
+                          <a:effectLst>
+                            <a:outerShdw blurRad="38100" dist="38100" dir="2700000" algn="tl">
+                              <a:srgbClr val="000000">
+                                <a:alpha val="43137"/>
+                              </a:srgbClr>
+                            </a:outerShdw>
+                          </a:effectLst>
+                          <a:latin typeface="Cambria Math" panose="02040503050406030204" pitchFamily="18" charset="0"/>
+                        </a:rPr>
+                        <m:t>.</m:t>
+                      </m:r>
+                      <m:r>
+                        <a:rPr lang="en-US" sz="1000" b="1" i="1" smtClean="0">
+                          <a:solidFill>
+                            <a:schemeClr val="tx1"/>
+                          </a:solidFill>
+                          <a:effectLst>
+                            <a:outerShdw blurRad="38100" dist="38100" dir="2700000" algn="tl">
+                              <a:srgbClr val="000000">
+                                <a:alpha val="43137"/>
+                              </a:srgbClr>
+                            </a:outerShdw>
+                          </a:effectLst>
+                          <a:latin typeface="Cambria Math" panose="02040503050406030204" pitchFamily="18" charset="0"/>
+                        </a:rPr>
+                        <m:t>𝟓</m:t>
+                      </m:r>
+                      <m:r>
+                        <a:rPr lang="en-US" sz="1000" b="1" i="1" smtClean="0">
+                          <a:solidFill>
+                            <a:schemeClr val="tx1"/>
+                          </a:solidFill>
+                          <a:effectLst>
+                            <a:outerShdw blurRad="38100" dist="38100" dir="2700000" algn="tl">
+                              <a:srgbClr val="000000">
+                                <a:alpha val="43137"/>
+                              </a:srgbClr>
+                            </a:outerShdw>
+                          </a:effectLst>
+                          <a:latin typeface="Cambria Math" panose="02040503050406030204" pitchFamily="18" charset="0"/>
+                          <a:ea typeface="Cambria Math" panose="02040503050406030204" pitchFamily="18" charset="0"/>
+                        </a:rPr>
+                        <m:t>∆</m:t>
+                      </m:r>
+                      <m:r>
+                        <a:rPr lang="en-US" sz="1000" b="1" i="1" smtClean="0">
+                          <a:solidFill>
+                            <a:schemeClr val="tx1"/>
+                          </a:solidFill>
+                          <a:effectLst>
+                            <a:outerShdw blurRad="38100" dist="38100" dir="2700000" algn="tl">
+                              <a:srgbClr val="000000">
+                                <a:alpha val="43137"/>
+                              </a:srgbClr>
+                            </a:outerShdw>
+                          </a:effectLst>
+                          <a:latin typeface="Cambria Math" panose="02040503050406030204" pitchFamily="18" charset="0"/>
+                          <a:ea typeface="Cambria Math" panose="02040503050406030204" pitchFamily="18" charset="0"/>
+                        </a:rPr>
+                        <m:t>𝒕</m:t>
+                      </m:r>
+                      <m:r>
+                        <a:rPr lang="en-US" sz="1000" b="1" i="1" smtClean="0">
+                          <a:solidFill>
+                            <a:schemeClr val="tx1"/>
+                          </a:solidFill>
+                          <a:effectLst>
+                            <a:outerShdw blurRad="38100" dist="38100" dir="2700000" algn="tl">
+                              <a:srgbClr val="000000">
+                                <a:alpha val="43137"/>
+                              </a:srgbClr>
+                            </a:outerShdw>
+                          </a:effectLst>
+                          <a:latin typeface="Cambria Math" panose="02040503050406030204" pitchFamily="18" charset="0"/>
+                          <a:ea typeface="Cambria Math" panose="02040503050406030204" pitchFamily="18" charset="0"/>
+                        </a:rPr>
+                        <m:t>,</m:t>
+                      </m:r>
+                      <m:r>
+                        <a:rPr lang="en-US" sz="1000" b="1" i="1" smtClean="0">
+                          <a:solidFill>
+                            <a:schemeClr val="tx1"/>
+                          </a:solidFill>
+                          <a:effectLst>
+                            <a:outerShdw blurRad="38100" dist="38100" dir="2700000" algn="tl">
+                              <a:srgbClr val="000000">
+                                <a:alpha val="43137"/>
+                              </a:srgbClr>
+                            </a:outerShdw>
+                          </a:effectLst>
+                          <a:latin typeface="Cambria Math" panose="02040503050406030204" pitchFamily="18" charset="0"/>
+                          <a:ea typeface="Cambria Math" panose="02040503050406030204" pitchFamily="18" charset="0"/>
+                        </a:rPr>
+                        <m:t>𝒙</m:t>
+                      </m:r>
+                      <m:r>
+                        <a:rPr lang="en-US" sz="1000" b="1" i="1" smtClean="0">
+                          <a:solidFill>
+                            <a:schemeClr val="tx1"/>
+                          </a:solidFill>
+                          <a:effectLst>
+                            <a:outerShdw blurRad="38100" dist="38100" dir="2700000" algn="tl">
+                              <a:srgbClr val="000000">
+                                <a:alpha val="43137"/>
+                              </a:srgbClr>
+                            </a:outerShdw>
+                          </a:effectLst>
+                          <a:latin typeface="Cambria Math" panose="02040503050406030204" pitchFamily="18" charset="0"/>
+                          <a:ea typeface="Cambria Math" panose="02040503050406030204" pitchFamily="18" charset="0"/>
+                        </a:rPr>
+                        <m:t>+</m:t>
+                      </m:r>
+                      <m:r>
+                        <a:rPr lang="en-US" sz="1000" b="1" i="1" smtClean="0">
+                          <a:solidFill>
+                            <a:schemeClr val="tx1"/>
+                          </a:solidFill>
+                          <a:effectLst>
+                            <a:outerShdw blurRad="38100" dist="38100" dir="2700000" algn="tl">
+                              <a:srgbClr val="000000">
+                                <a:alpha val="43137"/>
+                              </a:srgbClr>
+                            </a:outerShdw>
+                          </a:effectLst>
+                          <a:latin typeface="Cambria Math" panose="02040503050406030204" pitchFamily="18" charset="0"/>
+                          <a:ea typeface="Cambria Math" panose="02040503050406030204" pitchFamily="18" charset="0"/>
+                        </a:rPr>
+                        <m:t>𝟎</m:t>
+                      </m:r>
+                      <m:r>
+                        <a:rPr lang="en-US" sz="1000" b="1" i="1" smtClean="0">
+                          <a:solidFill>
+                            <a:schemeClr val="tx1"/>
+                          </a:solidFill>
+                          <a:effectLst>
+                            <a:outerShdw blurRad="38100" dist="38100" dir="2700000" algn="tl">
+                              <a:srgbClr val="000000">
+                                <a:alpha val="43137"/>
+                              </a:srgbClr>
+                            </a:outerShdw>
+                          </a:effectLst>
+                          <a:latin typeface="Cambria Math" panose="02040503050406030204" pitchFamily="18" charset="0"/>
+                          <a:ea typeface="Cambria Math" panose="02040503050406030204" pitchFamily="18" charset="0"/>
+                        </a:rPr>
+                        <m:t>.</m:t>
+                      </m:r>
+                      <m:r>
+                        <a:rPr lang="en-US" sz="1000" b="1" i="1" smtClean="0">
+                          <a:solidFill>
+                            <a:schemeClr val="tx1"/>
+                          </a:solidFill>
+                          <a:effectLst>
+                            <a:outerShdw blurRad="38100" dist="38100" dir="2700000" algn="tl">
+                              <a:srgbClr val="000000">
+                                <a:alpha val="43137"/>
+                              </a:srgbClr>
+                            </a:outerShdw>
+                          </a:effectLst>
+                          <a:latin typeface="Cambria Math" panose="02040503050406030204" pitchFamily="18" charset="0"/>
+                          <a:ea typeface="Cambria Math" panose="02040503050406030204" pitchFamily="18" charset="0"/>
+                        </a:rPr>
+                        <m:t>𝟓</m:t>
+                      </m:r>
+                      <m:r>
+                        <a:rPr lang="en-US" sz="1000" b="1" i="1" smtClean="0">
+                          <a:solidFill>
+                            <a:schemeClr val="tx1"/>
+                          </a:solidFill>
+                          <a:effectLst>
+                            <a:outerShdw blurRad="38100" dist="38100" dir="2700000" algn="tl">
+                              <a:srgbClr val="000000">
+                                <a:alpha val="43137"/>
+                              </a:srgbClr>
+                            </a:outerShdw>
+                          </a:effectLst>
+                          <a:latin typeface="Cambria Math" panose="02040503050406030204" pitchFamily="18" charset="0"/>
+                          <a:ea typeface="Cambria Math" panose="02040503050406030204" pitchFamily="18" charset="0"/>
+                        </a:rPr>
+                        <m:t>∆</m:t>
+                      </m:r>
+                      <m:r>
+                        <a:rPr lang="en-US" sz="1000" b="1" i="1" smtClean="0">
+                          <a:solidFill>
+                            <a:schemeClr val="tx1"/>
+                          </a:solidFill>
+                          <a:effectLst>
+                            <a:outerShdw blurRad="38100" dist="38100" dir="2700000" algn="tl">
+                              <a:srgbClr val="000000">
+                                <a:alpha val="43137"/>
+                              </a:srgbClr>
+                            </a:outerShdw>
+                          </a:effectLst>
+                          <a:latin typeface="Cambria Math" panose="02040503050406030204" pitchFamily="18" charset="0"/>
+                          <a:ea typeface="Cambria Math" panose="02040503050406030204" pitchFamily="18" charset="0"/>
+                        </a:rPr>
+                        <m:t>𝒕</m:t>
+                      </m:r>
+                      <m:sSub>
+                        <m:sSubPr>
+                          <m:ctrlPr>
+                            <a:rPr lang="en-US" sz="1000" b="1" i="1" smtClean="0">
+                              <a:solidFill>
+                                <a:schemeClr val="tx1"/>
+                              </a:solidFill>
+                              <a:effectLst>
+                                <a:outerShdw blurRad="38100" dist="38100" dir="2700000" algn="tl">
+                                  <a:srgbClr val="000000">
+                                    <a:alpha val="43137"/>
+                                  </a:srgbClr>
+                                </a:outerShdw>
+                              </a:effectLst>
+                              <a:latin typeface="Cambria Math" panose="02040503050406030204" pitchFamily="18" charset="0"/>
+                              <a:ea typeface="Cambria Math" panose="02040503050406030204" pitchFamily="18" charset="0"/>
+                            </a:rPr>
+                          </m:ctrlPr>
+                        </m:sSubPr>
+                        <m:e>
+                          <m:r>
+                            <a:rPr lang="en-US" sz="1000" b="1" i="1" smtClean="0">
+                              <a:solidFill>
+                                <a:schemeClr val="tx1"/>
+                              </a:solidFill>
+                              <a:effectLst>
+                                <a:outerShdw blurRad="38100" dist="38100" dir="2700000" algn="tl">
+                                  <a:srgbClr val="000000">
+                                    <a:alpha val="43137"/>
+                                  </a:srgbClr>
+                                </a:outerShdw>
+                              </a:effectLst>
+                              <a:latin typeface="Cambria Math" panose="02040503050406030204" pitchFamily="18" charset="0"/>
+                              <a:ea typeface="Cambria Math" panose="02040503050406030204" pitchFamily="18" charset="0"/>
+                            </a:rPr>
+                            <m:t>𝒌</m:t>
+                          </m:r>
+                        </m:e>
+                        <m:sub>
+                          <m:r>
+                            <a:rPr lang="en-US" sz="1000" b="1" i="1" smtClean="0">
+                              <a:solidFill>
+                                <a:schemeClr val="tx1"/>
+                              </a:solidFill>
+                              <a:effectLst>
+                                <a:outerShdw blurRad="38100" dist="38100" dir="2700000" algn="tl">
+                                  <a:srgbClr val="000000">
+                                    <a:alpha val="43137"/>
+                                  </a:srgbClr>
+                                </a:outerShdw>
+                              </a:effectLst>
+                              <a:latin typeface="Cambria Math" panose="02040503050406030204" pitchFamily="18" charset="0"/>
+                              <a:ea typeface="Cambria Math" panose="02040503050406030204" pitchFamily="18" charset="0"/>
+                            </a:rPr>
+                            <m:t>𝟐</m:t>
+                          </m:r>
+                        </m:sub>
+                      </m:sSub>
+                      <m:r>
+                        <a:rPr lang="en-US" sz="1000" b="1" i="1" smtClean="0">
+                          <a:solidFill>
+                            <a:schemeClr val="tx1"/>
+                          </a:solidFill>
+                          <a:effectLst>
+                            <a:outerShdw blurRad="38100" dist="38100" dir="2700000" algn="tl">
+                              <a:srgbClr val="000000">
+                                <a:alpha val="43137"/>
+                              </a:srgbClr>
+                            </a:outerShdw>
+                          </a:effectLst>
+                          <a:latin typeface="Cambria Math" panose="02040503050406030204" pitchFamily="18" charset="0"/>
+                        </a:rPr>
+                        <m:t>)</m:t>
+                      </m:r>
+                    </m:oMath>
+                  </m:oMathPara>
+                </a14:m>
+                <a:endParaRPr lang="en-US" sz="1000" b="1" i="1" dirty="0">
+                  <a:solidFill>
+                    <a:schemeClr val="tx1"/>
+                  </a:solidFill>
+                  <a:effectLst>
+                    <a:outerShdw blurRad="38100" dist="38100" dir="2700000" algn="tl">
+                      <a:srgbClr val="000000">
+                        <a:alpha val="43137"/>
+                      </a:srgbClr>
+                    </a:outerShdw>
+                  </a:effectLst>
+                </a:endParaRPr>
+              </a:p>
+              <a:p>
+                <a:pPr/>
+                <a14:m>
+                  <m:oMathPara xmlns:m="http://schemas.openxmlformats.org/officeDocument/2006/math">
+                    <m:oMathParaPr>
+                      <m:jc m:val="left"/>
+                    </m:oMathParaPr>
+                    <m:oMath xmlns:m="http://schemas.openxmlformats.org/officeDocument/2006/math">
+                      <m:sSub>
+                        <m:sSubPr>
+                          <m:ctrlPr>
+                            <a:rPr lang="en-US" sz="1000" b="1" i="1" smtClean="0">
+                              <a:solidFill>
+                                <a:schemeClr val="tx1"/>
+                              </a:solidFill>
+                              <a:effectLst>
+                                <a:outerShdw blurRad="38100" dist="38100" dir="2700000" algn="tl">
+                                  <a:srgbClr val="000000">
+                                    <a:alpha val="43137"/>
+                                  </a:srgbClr>
+                                </a:outerShdw>
+                              </a:effectLst>
+                              <a:latin typeface="Cambria Math" panose="02040503050406030204" pitchFamily="18" charset="0"/>
+                            </a:rPr>
+                          </m:ctrlPr>
+                        </m:sSubPr>
+                        <m:e>
+                          <m:r>
+                            <a:rPr lang="en-US" sz="1000" b="1" i="1" smtClean="0">
+                              <a:solidFill>
+                                <a:schemeClr val="tx1"/>
+                              </a:solidFill>
+                              <a:effectLst>
+                                <a:outerShdw blurRad="38100" dist="38100" dir="2700000" algn="tl">
+                                  <a:srgbClr val="000000">
+                                    <a:alpha val="43137"/>
+                                  </a:srgbClr>
+                                </a:outerShdw>
+                              </a:effectLst>
+                              <a:latin typeface="Cambria Math" panose="02040503050406030204" pitchFamily="18" charset="0"/>
+                            </a:rPr>
+                            <m:t>𝒌</m:t>
+                          </m:r>
+                        </m:e>
+                        <m:sub>
+                          <m:r>
+                            <a:rPr lang="en-US" sz="1000" b="1" i="1" smtClean="0">
+                              <a:solidFill>
+                                <a:schemeClr val="tx1"/>
+                              </a:solidFill>
+                              <a:effectLst>
+                                <a:outerShdw blurRad="38100" dist="38100" dir="2700000" algn="tl">
+                                  <a:srgbClr val="000000">
+                                    <a:alpha val="43137"/>
+                                  </a:srgbClr>
+                                </a:outerShdw>
+                              </a:effectLst>
+                              <a:latin typeface="Cambria Math" panose="02040503050406030204" pitchFamily="18" charset="0"/>
+                            </a:rPr>
+                            <m:t>𝟒</m:t>
+                          </m:r>
+                        </m:sub>
+                      </m:sSub>
+                      <m:r>
+                        <a:rPr lang="en-US" sz="1000" b="1" i="1" smtClean="0">
+                          <a:solidFill>
+                            <a:schemeClr val="tx1"/>
+                          </a:solidFill>
+                          <a:effectLst>
+                            <a:outerShdw blurRad="38100" dist="38100" dir="2700000" algn="tl">
+                              <a:srgbClr val="000000">
+                                <a:alpha val="43137"/>
+                              </a:srgbClr>
+                            </a:outerShdw>
+                          </a:effectLst>
+                          <a:latin typeface="Cambria Math" panose="02040503050406030204" pitchFamily="18" charset="0"/>
+                        </a:rPr>
+                        <m:t>=</m:t>
+                      </m:r>
+                      <m:r>
+                        <a:rPr lang="en-US" sz="1000" b="1" i="1" smtClean="0">
+                          <a:solidFill>
+                            <a:schemeClr val="tx1"/>
+                          </a:solidFill>
+                          <a:effectLst>
+                            <a:outerShdw blurRad="38100" dist="38100" dir="2700000" algn="tl">
+                              <a:srgbClr val="000000">
+                                <a:alpha val="43137"/>
+                              </a:srgbClr>
+                            </a:outerShdw>
+                          </a:effectLst>
+                          <a:latin typeface="Cambria Math" panose="02040503050406030204" pitchFamily="18" charset="0"/>
+                        </a:rPr>
+                        <m:t>𝒇</m:t>
+                      </m:r>
+                      <m:r>
+                        <a:rPr lang="en-US" sz="1000" b="1" i="1" smtClean="0">
+                          <a:solidFill>
+                            <a:schemeClr val="tx1"/>
+                          </a:solidFill>
+                          <a:effectLst>
+                            <a:outerShdw blurRad="38100" dist="38100" dir="2700000" algn="tl">
+                              <a:srgbClr val="000000">
+                                <a:alpha val="43137"/>
+                              </a:srgbClr>
+                            </a:outerShdw>
+                          </a:effectLst>
+                          <a:latin typeface="Cambria Math" panose="02040503050406030204" pitchFamily="18" charset="0"/>
+                        </a:rPr>
+                        <m:t>(</m:t>
+                      </m:r>
+                      <m:r>
+                        <a:rPr lang="en-US" sz="1000" b="1" i="1" smtClean="0">
+                          <a:solidFill>
+                            <a:schemeClr val="tx1"/>
+                          </a:solidFill>
+                          <a:effectLst>
+                            <a:outerShdw blurRad="38100" dist="38100" dir="2700000" algn="tl">
+                              <a:srgbClr val="000000">
+                                <a:alpha val="43137"/>
+                              </a:srgbClr>
+                            </a:outerShdw>
+                          </a:effectLst>
+                          <a:latin typeface="Cambria Math" panose="02040503050406030204" pitchFamily="18" charset="0"/>
+                        </a:rPr>
+                        <m:t>𝒕</m:t>
+                      </m:r>
+                      <m:r>
+                        <a:rPr lang="en-US" sz="1000" b="1" i="1" smtClean="0">
+                          <a:solidFill>
+                            <a:schemeClr val="tx1"/>
+                          </a:solidFill>
+                          <a:effectLst>
+                            <a:outerShdw blurRad="38100" dist="38100" dir="2700000" algn="tl">
+                              <a:srgbClr val="000000">
+                                <a:alpha val="43137"/>
+                              </a:srgbClr>
+                            </a:outerShdw>
+                          </a:effectLst>
+                          <a:latin typeface="Cambria Math" panose="02040503050406030204" pitchFamily="18" charset="0"/>
+                        </a:rPr>
+                        <m:t>+∆</m:t>
+                      </m:r>
+                      <m:r>
+                        <a:rPr lang="en-US" sz="1000" b="1" i="1" smtClean="0">
+                          <a:solidFill>
+                            <a:schemeClr val="tx1"/>
+                          </a:solidFill>
+                          <a:effectLst>
+                            <a:outerShdw blurRad="38100" dist="38100" dir="2700000" algn="tl">
+                              <a:srgbClr val="000000">
+                                <a:alpha val="43137"/>
+                              </a:srgbClr>
+                            </a:outerShdw>
+                          </a:effectLst>
+                          <a:latin typeface="Cambria Math" panose="02040503050406030204" pitchFamily="18" charset="0"/>
+                          <a:ea typeface="Cambria Math" panose="02040503050406030204" pitchFamily="18" charset="0"/>
+                        </a:rPr>
+                        <m:t>𝒕</m:t>
+                      </m:r>
+                      <m:r>
+                        <a:rPr lang="en-US" sz="1000" b="1" i="1" smtClean="0">
+                          <a:solidFill>
+                            <a:schemeClr val="tx1"/>
+                          </a:solidFill>
+                          <a:effectLst>
+                            <a:outerShdw blurRad="38100" dist="38100" dir="2700000" algn="tl">
+                              <a:srgbClr val="000000">
+                                <a:alpha val="43137"/>
+                              </a:srgbClr>
+                            </a:outerShdw>
+                          </a:effectLst>
+                          <a:latin typeface="Cambria Math" panose="02040503050406030204" pitchFamily="18" charset="0"/>
+                          <a:ea typeface="Cambria Math" panose="02040503050406030204" pitchFamily="18" charset="0"/>
+                        </a:rPr>
+                        <m:t>,</m:t>
+                      </m:r>
+                      <m:r>
+                        <a:rPr lang="en-US" sz="1000" b="1" i="1" smtClean="0">
+                          <a:solidFill>
+                            <a:schemeClr val="tx1"/>
+                          </a:solidFill>
+                          <a:effectLst>
+                            <a:outerShdw blurRad="38100" dist="38100" dir="2700000" algn="tl">
+                              <a:srgbClr val="000000">
+                                <a:alpha val="43137"/>
+                              </a:srgbClr>
+                            </a:outerShdw>
+                          </a:effectLst>
+                          <a:latin typeface="Cambria Math" panose="02040503050406030204" pitchFamily="18" charset="0"/>
+                          <a:ea typeface="Cambria Math" panose="02040503050406030204" pitchFamily="18" charset="0"/>
+                        </a:rPr>
+                        <m:t>𝒙</m:t>
+                      </m:r>
+                      <m:r>
+                        <a:rPr lang="en-US" sz="1000" b="1" i="1" smtClean="0">
+                          <a:solidFill>
+                            <a:schemeClr val="tx1"/>
+                          </a:solidFill>
+                          <a:effectLst>
+                            <a:outerShdw blurRad="38100" dist="38100" dir="2700000" algn="tl">
+                              <a:srgbClr val="000000">
+                                <a:alpha val="43137"/>
+                              </a:srgbClr>
+                            </a:outerShdw>
+                          </a:effectLst>
+                          <a:latin typeface="Cambria Math" panose="02040503050406030204" pitchFamily="18" charset="0"/>
+                          <a:ea typeface="Cambria Math" panose="02040503050406030204" pitchFamily="18" charset="0"/>
+                        </a:rPr>
+                        <m:t>+∆</m:t>
+                      </m:r>
+                      <m:r>
+                        <a:rPr lang="en-US" sz="1000" b="1" i="1" smtClean="0">
+                          <a:solidFill>
+                            <a:schemeClr val="tx1"/>
+                          </a:solidFill>
+                          <a:effectLst>
+                            <a:outerShdw blurRad="38100" dist="38100" dir="2700000" algn="tl">
+                              <a:srgbClr val="000000">
+                                <a:alpha val="43137"/>
+                              </a:srgbClr>
+                            </a:outerShdw>
+                          </a:effectLst>
+                          <a:latin typeface="Cambria Math" panose="02040503050406030204" pitchFamily="18" charset="0"/>
+                          <a:ea typeface="Cambria Math" panose="02040503050406030204" pitchFamily="18" charset="0"/>
+                        </a:rPr>
+                        <m:t>𝒕</m:t>
+                      </m:r>
+                      <m:sSub>
+                        <m:sSubPr>
+                          <m:ctrlPr>
+                            <a:rPr lang="en-US" sz="1000" b="1" i="1" smtClean="0">
+                              <a:solidFill>
+                                <a:schemeClr val="tx1"/>
+                              </a:solidFill>
+                              <a:effectLst>
+                                <a:outerShdw blurRad="38100" dist="38100" dir="2700000" algn="tl">
+                                  <a:srgbClr val="000000">
+                                    <a:alpha val="43137"/>
+                                  </a:srgbClr>
+                                </a:outerShdw>
+                              </a:effectLst>
+                              <a:latin typeface="Cambria Math" panose="02040503050406030204" pitchFamily="18" charset="0"/>
+                              <a:ea typeface="Cambria Math" panose="02040503050406030204" pitchFamily="18" charset="0"/>
+                            </a:rPr>
+                          </m:ctrlPr>
+                        </m:sSubPr>
+                        <m:e>
+                          <m:r>
+                            <a:rPr lang="en-US" sz="1000" b="1" i="1" smtClean="0">
+                              <a:solidFill>
+                                <a:schemeClr val="tx1"/>
+                              </a:solidFill>
+                              <a:effectLst>
+                                <a:outerShdw blurRad="38100" dist="38100" dir="2700000" algn="tl">
+                                  <a:srgbClr val="000000">
+                                    <a:alpha val="43137"/>
+                                  </a:srgbClr>
+                                </a:outerShdw>
+                              </a:effectLst>
+                              <a:latin typeface="Cambria Math" panose="02040503050406030204" pitchFamily="18" charset="0"/>
+                              <a:ea typeface="Cambria Math" panose="02040503050406030204" pitchFamily="18" charset="0"/>
+                            </a:rPr>
+                            <m:t>𝒌</m:t>
+                          </m:r>
+                        </m:e>
+                        <m:sub>
+                          <m:r>
+                            <a:rPr lang="en-US" sz="1000" b="1" i="1" smtClean="0">
+                              <a:solidFill>
+                                <a:schemeClr val="tx1"/>
+                              </a:solidFill>
+                              <a:effectLst>
+                                <a:outerShdw blurRad="38100" dist="38100" dir="2700000" algn="tl">
+                                  <a:srgbClr val="000000">
+                                    <a:alpha val="43137"/>
+                                  </a:srgbClr>
+                                </a:outerShdw>
+                              </a:effectLst>
+                              <a:latin typeface="Cambria Math" panose="02040503050406030204" pitchFamily="18" charset="0"/>
+                              <a:ea typeface="Cambria Math" panose="02040503050406030204" pitchFamily="18" charset="0"/>
+                            </a:rPr>
+                            <m:t>𝟑</m:t>
+                          </m:r>
+                        </m:sub>
+                      </m:sSub>
+                      <m:r>
+                        <a:rPr lang="en-US" sz="1000" b="1" i="1" smtClean="0">
+                          <a:solidFill>
+                            <a:schemeClr val="tx1"/>
+                          </a:solidFill>
+                          <a:effectLst>
+                            <a:outerShdw blurRad="38100" dist="38100" dir="2700000" algn="tl">
+                              <a:srgbClr val="000000">
+                                <a:alpha val="43137"/>
+                              </a:srgbClr>
+                            </a:outerShdw>
+                          </a:effectLst>
+                          <a:latin typeface="Cambria Math" panose="02040503050406030204" pitchFamily="18" charset="0"/>
+                        </a:rPr>
+                        <m:t>)</m:t>
+                      </m:r>
+                    </m:oMath>
+                  </m:oMathPara>
+                </a14:m>
+                <a:endParaRPr lang="en-US" sz="1000" b="1" i="1" dirty="0">
+                  <a:solidFill>
+                    <a:schemeClr val="tx1"/>
+                  </a:solidFill>
+                  <a:effectLst>
+                    <a:outerShdw blurRad="38100" dist="38100" dir="2700000" algn="tl">
+                      <a:srgbClr val="000000">
+                        <a:alpha val="43137"/>
+                      </a:srgbClr>
+                    </a:outerShdw>
+                  </a:effectLst>
+                </a:endParaRPr>
+              </a:p>
+            </p:txBody>
+          </p:sp>
+        </mc:Choice>
+        <mc:Fallback>
+          <p:sp>
+            <p:nvSpPr>
+              <p:cNvPr id="52" name="TextBox 51">
+                <a:extLst>
+                  <a:ext uri="{FF2B5EF4-FFF2-40B4-BE49-F238E27FC236}">
+                    <a16:creationId xmlns:a16="http://schemas.microsoft.com/office/drawing/2014/main" id="{B09AE6E2-C75C-4BBD-B8A0-198FFE3DF832}"/>
+                  </a:ext>
+                </a:extLst>
+              </p:cNvPr>
+              <p:cNvSpPr txBox="1">
+                <a:spLocks noRot="1" noChangeAspect="1" noMove="1" noResize="1" noEditPoints="1" noAdjustHandles="1" noChangeArrowheads="1" noChangeShapeType="1" noTextEdit="1"/>
+              </p:cNvSpPr>
+              <p:nvPr/>
+            </p:nvSpPr>
+            <p:spPr>
+              <a:xfrm>
+                <a:off x="3923251" y="3568127"/>
+                <a:ext cx="2090295" cy="707886"/>
+              </a:xfrm>
+              <a:prstGeom prst="rect">
+                <a:avLst/>
+              </a:prstGeom>
+              <a:blipFill>
+                <a:blip r:embed="rId4"/>
+                <a:stretch>
+                  <a:fillRect b="-4310"/>
+                </a:stretch>
+              </a:blipFill>
+            </p:spPr>
+            <p:txBody>
+              <a:bodyPr/>
+              <a:lstStyle/>
+              <a:p>
+                <a:r>
+                  <a:rPr lang="en-US">
+                    <a:noFill/>
+                  </a:rPr>
+                  <a:t> </a:t>
+                </a:r>
+              </a:p>
+            </p:txBody>
+          </p:sp>
+        </mc:Fallback>
+      </mc:AlternateContent>
     </p:spTree>
     <p:extLst>
       <p:ext uri="{BB962C8B-B14F-4D97-AF65-F5344CB8AC3E}">

</xml_diff>